<commit_message>
Update screenshots in dev.Objective() deck
</commit_message>
<xml_diff>
--- a/Intro to JavaScript Tooling in VS Code - devObjective.pptx
+++ b/Intro to JavaScript Tooling in VS Code - devObjective.pptx
@@ -5,7 +5,7 @@
     <p:sldMasterId id="2147483718" r:id="rId1"/>
   </p:sldMasterIdLst>
   <p:notesMasterIdLst>
-    <p:notesMasterId r:id="rId33"/>
+    <p:notesMasterId r:id="rId32"/>
   </p:notesMasterIdLst>
   <p:sldIdLst>
     <p:sldId id="256" r:id="rId2"/>
@@ -25,20 +25,19 @@
     <p:sldId id="300" r:id="rId16"/>
     <p:sldId id="301" r:id="rId17"/>
     <p:sldId id="319" r:id="rId18"/>
-    <p:sldId id="303" r:id="rId19"/>
-    <p:sldId id="302" r:id="rId20"/>
-    <p:sldId id="292" r:id="rId21"/>
-    <p:sldId id="295" r:id="rId22"/>
-    <p:sldId id="299" r:id="rId23"/>
-    <p:sldId id="304" r:id="rId24"/>
-    <p:sldId id="305" r:id="rId25"/>
-    <p:sldId id="306" r:id="rId26"/>
-    <p:sldId id="307" r:id="rId27"/>
-    <p:sldId id="308" r:id="rId28"/>
-    <p:sldId id="309" r:id="rId29"/>
-    <p:sldId id="289" r:id="rId30"/>
-    <p:sldId id="317" r:id="rId31"/>
-    <p:sldId id="318" r:id="rId32"/>
+    <p:sldId id="302" r:id="rId19"/>
+    <p:sldId id="292" r:id="rId20"/>
+    <p:sldId id="295" r:id="rId21"/>
+    <p:sldId id="299" r:id="rId22"/>
+    <p:sldId id="304" r:id="rId23"/>
+    <p:sldId id="305" r:id="rId24"/>
+    <p:sldId id="306" r:id="rId25"/>
+    <p:sldId id="307" r:id="rId26"/>
+    <p:sldId id="308" r:id="rId27"/>
+    <p:sldId id="309" r:id="rId28"/>
+    <p:sldId id="289" r:id="rId29"/>
+    <p:sldId id="317" r:id="rId30"/>
+    <p:sldId id="318" r:id="rId31"/>
   </p:sldIdLst>
   <p:sldSz cx="12192000" cy="6858000"/>
   <p:notesSz cx="6858000" cy="9144000"/>
@@ -252,7 +251,7 @@
           <a:p>
             <a:fld id="{669E24BE-8A14-406C-93AE-FEDF4702362B}" type="datetimeFigureOut">
               <a:rPr lang="en-US" smtClean="0"/>
-              <a:t>6/12/2016</a:t>
+              <a:t>6/13/2016</a:t>
             </a:fld>
             <a:endParaRPr lang="en-US" dirty="0"/>
           </a:p>
@@ -1423,7 +1422,7 @@
           <a:p>
             <a:fld id="{8008D7A7-D1E9-49FE-B288-75D755D02F1B}" type="datetime1">
               <a:rPr lang="en-US" smtClean="0"/>
-              <a:t>6/12/2016</a:t>
+              <a:t>6/13/2016</a:t>
             </a:fld>
             <a:endParaRPr lang="en-US" dirty="0"/>
           </a:p>
@@ -1686,7 +1685,7 @@
           <a:p>
             <a:fld id="{565130A9-CCEE-4E49-AF50-9A9178C093F5}" type="datetime1">
               <a:rPr lang="en-US" smtClean="0"/>
-              <a:t>6/12/2016</a:t>
+              <a:t>6/13/2016</a:t>
             </a:fld>
             <a:endParaRPr lang="en-US" dirty="0"/>
           </a:p>
@@ -2012,7 +2011,7 @@
           <a:p>
             <a:fld id="{5FFEE7F5-B2E5-489A-976D-734D7F853DE3}" type="datetime1">
               <a:rPr lang="en-US" smtClean="0"/>
-              <a:t>6/12/2016</a:t>
+              <a:t>6/13/2016</a:t>
             </a:fld>
             <a:endParaRPr lang="en-US" dirty="0"/>
           </a:p>
@@ -2365,7 +2364,7 @@
           <a:p>
             <a:fld id="{1DDC5727-5F18-4B62-81B5-C092F8CCA971}" type="datetime1">
               <a:rPr lang="en-US" smtClean="0"/>
-              <a:t>6/12/2016</a:t>
+              <a:t>6/13/2016</a:t>
             </a:fld>
             <a:endParaRPr lang="en-US" dirty="0"/>
           </a:p>
@@ -2691,7 +2690,7 @@
           <a:p>
             <a:fld id="{DD7596D5-BBCA-4EE5-AC34-2F838BA68892}" type="datetime1">
               <a:rPr lang="en-US" smtClean="0"/>
-              <a:t>6/12/2016</a:t>
+              <a:t>6/13/2016</a:t>
             </a:fld>
             <a:endParaRPr lang="en-US" dirty="0"/>
           </a:p>
@@ -3096,7 +3095,7 @@
           <a:p>
             <a:fld id="{C87E594A-105F-4330-BE78-40BFD5E05FF3}" type="datetime1">
               <a:rPr lang="en-US" smtClean="0"/>
-              <a:t>6/12/2016</a:t>
+              <a:t>6/13/2016</a:t>
             </a:fld>
             <a:endParaRPr lang="en-US" dirty="0"/>
           </a:p>
@@ -3278,7 +3277,7 @@
           <a:p>
             <a:fld id="{50DAB467-0635-440B-9BC4-DA322DD73B70}" type="datetime1">
               <a:rPr lang="en-US" smtClean="0"/>
-              <a:t>6/12/2016</a:t>
+              <a:t>6/13/2016</a:t>
             </a:fld>
             <a:endParaRPr lang="en-US" dirty="0"/>
           </a:p>
@@ -3470,7 +3469,7 @@
           <a:p>
             <a:fld id="{5E48D92D-E3A5-4B10-B1FC-D041F161170C}" type="datetime1">
               <a:rPr lang="en-US" smtClean="0"/>
-              <a:t>6/12/2016</a:t>
+              <a:t>6/13/2016</a:t>
             </a:fld>
             <a:endParaRPr lang="en-US" dirty="0"/>
           </a:p>
@@ -3658,7 +3657,7 @@
           <a:p>
             <a:fld id="{834C18EA-D952-4AE1-A6E7-E6731635F9D2}" type="datetime1">
               <a:rPr lang="en-US" smtClean="0"/>
-              <a:t>6/12/2016</a:t>
+              <a:t>6/13/2016</a:t>
             </a:fld>
             <a:endParaRPr lang="en-US" dirty="0"/>
           </a:p>
@@ -3917,7 +3916,7 @@
           <a:p>
             <a:fld id="{13032A52-9E14-487A-A3FB-E00D36231CE7}" type="datetime1">
               <a:rPr lang="en-US" smtClean="0"/>
-              <a:t>6/12/2016</a:t>
+              <a:t>6/13/2016</a:t>
             </a:fld>
             <a:endParaRPr lang="en-US" dirty="0"/>
           </a:p>
@@ -4161,7 +4160,7 @@
           <a:p>
             <a:fld id="{8C5CA72F-91C6-447B-8CFD-10CC50FBFEAC}" type="datetime1">
               <a:rPr lang="en-US" smtClean="0"/>
-              <a:t>6/12/2016</a:t>
+              <a:t>6/13/2016</a:t>
             </a:fld>
             <a:endParaRPr lang="en-US" dirty="0"/>
           </a:p>
@@ -4547,7 +4546,7 @@
           <a:p>
             <a:fld id="{2CCBA931-94B6-4C88-A7AC-0B43FAFFEEC1}" type="datetime1">
               <a:rPr lang="en-US" smtClean="0"/>
-              <a:t>6/12/2016</a:t>
+              <a:t>6/13/2016</a:t>
             </a:fld>
             <a:endParaRPr lang="en-US" dirty="0"/>
           </a:p>
@@ -4682,7 +4681,7 @@
           <a:p>
             <a:fld id="{A17CC6B2-4719-4EFD-BB2D-A2C62F0625B7}" type="datetime1">
               <a:rPr lang="en-US" smtClean="0"/>
-              <a:t>6/12/2016</a:t>
+              <a:t>6/13/2016</a:t>
             </a:fld>
             <a:endParaRPr lang="en-US" dirty="0"/>
           </a:p>
@@ -4789,7 +4788,7 @@
           <a:p>
             <a:fld id="{9AC4E54B-2176-4BC1-BC54-F80551EDB034}" type="datetime1">
               <a:rPr lang="en-US" smtClean="0"/>
-              <a:t>6/12/2016</a:t>
+              <a:t>6/13/2016</a:t>
             </a:fld>
             <a:endParaRPr lang="en-US" dirty="0"/>
           </a:p>
@@ -5056,7 +5055,7 @@
           <a:p>
             <a:fld id="{F73BBE7C-717C-4AB2-A881-24835FA94B24}" type="datetime1">
               <a:rPr lang="en-US" smtClean="0"/>
-              <a:t>6/12/2016</a:t>
+              <a:t>6/13/2016</a:t>
             </a:fld>
             <a:endParaRPr lang="en-US" dirty="0"/>
           </a:p>
@@ -5330,7 +5329,7 @@
           <a:p>
             <a:fld id="{BD6C4C3D-17A3-49F5-8381-0500C8735BF2}" type="datetime1">
               <a:rPr lang="en-US" smtClean="0"/>
-              <a:t>6/12/2016</a:t>
+              <a:t>6/13/2016</a:t>
             </a:fld>
             <a:endParaRPr lang="en-US" dirty="0"/>
           </a:p>
@@ -6085,7 +6084,7 @@
           <a:p>
             <a:fld id="{1D480221-EA8F-4F92-87B7-59E96BBC3974}" type="datetime1">
               <a:rPr lang="en-US" smtClean="0"/>
-              <a:t>6/12/2016</a:t>
+              <a:t>6/13/2016</a:t>
             </a:fld>
             <a:endParaRPr lang="en-US" dirty="0"/>
           </a:p>
@@ -7608,189 +7607,196 @@
           <a:chExt cx="0" cy="0"/>
         </a:xfrm>
       </p:grpSpPr>
+      <p:sp>
+        <p:nvSpPr>
+          <p:cNvPr id="5" name="Title 4"/>
+          <p:cNvSpPr>
+            <a:spLocks noGrp="1"/>
+          </p:cNvSpPr>
+          <p:nvPr>
+            <p:ph type="title"/>
+          </p:nvPr>
+        </p:nvSpPr>
+        <p:spPr/>
+        <p:txBody>
+          <a:bodyPr/>
+          <a:lstStyle/>
+          <a:p>
+            <a:r>
+              <a:rPr lang="en-US" dirty="0"/>
+              <a:t>Library / Framework IntelliSense</a:t>
+            </a:r>
+          </a:p>
+        </p:txBody>
+      </p:sp>
+      <p:sp>
+        <p:nvSpPr>
+          <p:cNvPr id="6" name="Content Placeholder 5"/>
+          <p:cNvSpPr>
+            <a:spLocks noGrp="1"/>
+          </p:cNvSpPr>
+          <p:nvPr>
+            <p:ph idx="1"/>
+          </p:nvPr>
+        </p:nvSpPr>
+        <p:spPr/>
+        <p:txBody>
+          <a:bodyPr/>
+          <a:lstStyle/>
+          <a:p>
+            <a:r>
+              <a:rPr lang="en-US" dirty="0"/>
+              <a:t>Reliance on type definitions</a:t>
+            </a:r>
+          </a:p>
+          <a:p>
+            <a:pPr lvl="1"/>
+            <a:r>
+              <a:rPr lang="en-US" b="1" dirty="0"/>
+              <a:t>Deprecated:</a:t>
+            </a:r>
+            <a:r>
+              <a:rPr lang="en-US" dirty="0"/>
+              <a:t> </a:t>
+            </a:r>
+            <a:r>
+              <a:rPr lang="en-US" dirty="0">
+                <a:hlinkClick r:id="rId2"/>
+              </a:rPr>
+              <a:t>TSD</a:t>
+            </a:r>
+            <a:endParaRPr lang="en-US" dirty="0"/>
+          </a:p>
+          <a:p>
+            <a:pPr lvl="1"/>
+            <a:r>
+              <a:rPr lang="en-US" b="1" dirty="0"/>
+              <a:t>Now:</a:t>
+            </a:r>
+            <a:r>
+              <a:rPr lang="en-US" dirty="0"/>
+              <a:t> </a:t>
+            </a:r>
+            <a:r>
+              <a:rPr lang="en-US" dirty="0" err="1">
+                <a:hlinkClick r:id="rId3"/>
+              </a:rPr>
+              <a:t>Typings</a:t>
+            </a:r>
+            <a:endParaRPr lang="en-US" dirty="0"/>
+          </a:p>
+          <a:p>
+            <a:endParaRPr lang="en-US" b="1" dirty="0"/>
+          </a:p>
+          <a:p>
+            <a:r>
+              <a:rPr lang="en-US" b="1" dirty="0">
+                <a:latin typeface="Consolas" panose="020B0609020204030204" pitchFamily="49" charset="0"/>
+                <a:cs typeface="Consolas" panose="020B0609020204030204" pitchFamily="49" charset="0"/>
+              </a:rPr>
+              <a:t>&gt;</a:t>
+            </a:r>
+            <a:r>
+              <a:rPr lang="en-US" dirty="0">
+                <a:latin typeface="Consolas" panose="020B0609020204030204" pitchFamily="49" charset="0"/>
+                <a:cs typeface="Consolas" panose="020B0609020204030204" pitchFamily="49" charset="0"/>
+              </a:rPr>
+              <a:t> npm install –g </a:t>
+            </a:r>
+            <a:r>
+              <a:rPr lang="en-US" dirty="0" err="1">
+                <a:latin typeface="Consolas" panose="020B0609020204030204" pitchFamily="49" charset="0"/>
+                <a:cs typeface="Consolas" panose="020B0609020204030204" pitchFamily="49" charset="0"/>
+              </a:rPr>
+              <a:t>typings</a:t>
+            </a:r>
+            <a:endParaRPr lang="en-US" dirty="0">
+              <a:latin typeface="Consolas" panose="020B0609020204030204" pitchFamily="49" charset="0"/>
+              <a:cs typeface="Consolas" panose="020B0609020204030204" pitchFamily="49" charset="0"/>
+            </a:endParaRPr>
+          </a:p>
+          <a:p>
+            <a:pPr lvl="1"/>
+            <a:endParaRPr lang="en-US" dirty="0">
+              <a:latin typeface="Consolas" panose="020B0609020204030204" pitchFamily="49" charset="0"/>
+              <a:cs typeface="Consolas" panose="020B0609020204030204" pitchFamily="49" charset="0"/>
+            </a:endParaRPr>
+          </a:p>
+          <a:p>
+            <a:r>
+              <a:rPr lang="en-US" dirty="0">
+                <a:latin typeface="Consolas" panose="020B0609020204030204" pitchFamily="49" charset="0"/>
+                <a:cs typeface="Consolas" panose="020B0609020204030204" pitchFamily="49" charset="0"/>
+              </a:rPr>
+              <a:t>*.d.ts files provide metadata to editor</a:t>
+            </a:r>
+          </a:p>
+          <a:p>
+            <a:pPr lvl="1"/>
+            <a:r>
+              <a:rPr lang="en-US" dirty="0">
+                <a:latin typeface="Consolas" panose="020B0609020204030204" pitchFamily="49" charset="0"/>
+                <a:cs typeface="Consolas" panose="020B0609020204030204" pitchFamily="49" charset="0"/>
+              </a:rPr>
+              <a:t>angular.d.ts, jquery.d.ts, etc.</a:t>
+            </a:r>
+          </a:p>
+        </p:txBody>
+      </p:sp>
+      <p:sp>
+        <p:nvSpPr>
+          <p:cNvPr id="4" name="Slide Number Placeholder 3"/>
+          <p:cNvSpPr>
+            <a:spLocks noGrp="1"/>
+          </p:cNvSpPr>
+          <p:nvPr>
+            <p:ph type="sldNum" sz="quarter" idx="12"/>
+          </p:nvPr>
+        </p:nvSpPr>
+        <p:spPr/>
+        <p:txBody>
+          <a:bodyPr/>
+          <a:lstStyle/>
+          <a:p>
+            <a:fld id="{CA6404EB-EC22-4A9F-B979-51DB938C35B6}" type="slidenum">
+              <a:rPr lang="en-US" smtClean="0"/>
+              <a:t>15</a:t>
+            </a:fld>
+            <a:endParaRPr lang="en-US" dirty="0"/>
+          </a:p>
+        </p:txBody>
+      </p:sp>
       <p:pic>
         <p:nvPicPr>
-          <p:cNvPr id="3" name="Picture 2"/>
+          <p:cNvPr id="2" name="Picture 1"/>
           <p:cNvPicPr>
             <a:picLocks noChangeAspect="1"/>
           </p:cNvPicPr>
           <p:nvPr/>
         </p:nvPicPr>
         <p:blipFill>
-          <a:blip r:embed="rId2"/>
+          <a:blip r:embed="rId4"/>
           <a:stretch>
             <a:fillRect/>
           </a:stretch>
         </p:blipFill>
         <p:spPr>
           <a:xfrm>
-            <a:off x="7457349" y="2248688"/>
-            <a:ext cx="3381375" cy="3438525"/>
+            <a:off x="8058150" y="729587"/>
+            <a:ext cx="3695700" cy="5676900"/>
           </a:xfrm>
           <a:prstGeom prst="rect">
             <a:avLst/>
           </a:prstGeom>
+          <a:effectLst>
+            <a:outerShdw blurRad="63500" sx="102000" sy="102000" algn="ctr" rotWithShape="0">
+              <a:prstClr val="black">
+                <a:alpha val="40000"/>
+              </a:prstClr>
+            </a:outerShdw>
+          </a:effectLst>
         </p:spPr>
       </p:pic>
-      <p:sp>
-        <p:nvSpPr>
-          <p:cNvPr id="5" name="Title 4"/>
-          <p:cNvSpPr>
-            <a:spLocks noGrp="1"/>
-          </p:cNvSpPr>
-          <p:nvPr>
-            <p:ph type="title"/>
-          </p:nvPr>
-        </p:nvSpPr>
-        <p:spPr/>
-        <p:txBody>
-          <a:bodyPr/>
-          <a:lstStyle/>
-          <a:p>
-            <a:r>
-              <a:rPr lang="en-US" dirty="0"/>
-              <a:t>Library / Framework IntelliSense</a:t>
-            </a:r>
-          </a:p>
-        </p:txBody>
-      </p:sp>
-      <p:sp>
-        <p:nvSpPr>
-          <p:cNvPr id="6" name="Content Placeholder 5"/>
-          <p:cNvSpPr>
-            <a:spLocks noGrp="1"/>
-          </p:cNvSpPr>
-          <p:nvPr>
-            <p:ph idx="1"/>
-          </p:nvPr>
-        </p:nvSpPr>
-        <p:spPr/>
-        <p:txBody>
-          <a:bodyPr/>
-          <a:lstStyle/>
-          <a:p>
-            <a:r>
-              <a:rPr lang="en-US" dirty="0"/>
-              <a:t>Reliance on type definitions</a:t>
-            </a:r>
-          </a:p>
-          <a:p>
-            <a:pPr lvl="1"/>
-            <a:r>
-              <a:rPr lang="en-US" b="1" dirty="0"/>
-              <a:t>Deprecated:</a:t>
-            </a:r>
-            <a:r>
-              <a:rPr lang="en-US" dirty="0"/>
-              <a:t> </a:t>
-            </a:r>
-            <a:r>
-              <a:rPr lang="en-US" dirty="0">
-                <a:hlinkClick r:id="rId3"/>
-              </a:rPr>
-              <a:t>TSD</a:t>
-            </a:r>
-            <a:endParaRPr lang="en-US" dirty="0"/>
-          </a:p>
-          <a:p>
-            <a:pPr lvl="1"/>
-            <a:r>
-              <a:rPr lang="en-US" b="1" dirty="0"/>
-              <a:t>Now:</a:t>
-            </a:r>
-            <a:r>
-              <a:rPr lang="en-US" dirty="0"/>
-              <a:t> </a:t>
-            </a:r>
-            <a:r>
-              <a:rPr lang="en-US" dirty="0" err="1">
-                <a:hlinkClick r:id="rId4"/>
-              </a:rPr>
-              <a:t>Typings</a:t>
-            </a:r>
-            <a:endParaRPr lang="en-US" dirty="0"/>
-          </a:p>
-          <a:p>
-            <a:endParaRPr lang="en-US" b="1" dirty="0"/>
-          </a:p>
-          <a:p>
-            <a:r>
-              <a:rPr lang="en-US" b="1" dirty="0">
-                <a:latin typeface="Consolas" panose="020B0609020204030204" pitchFamily="49" charset="0"/>
-                <a:cs typeface="Consolas" panose="020B0609020204030204" pitchFamily="49" charset="0"/>
-              </a:rPr>
-              <a:t>&gt;</a:t>
-            </a:r>
-            <a:r>
-              <a:rPr lang="en-US" dirty="0">
-                <a:latin typeface="Consolas" panose="020B0609020204030204" pitchFamily="49" charset="0"/>
-                <a:cs typeface="Consolas" panose="020B0609020204030204" pitchFamily="49" charset="0"/>
-              </a:rPr>
-              <a:t> npm install –g </a:t>
-            </a:r>
-            <a:r>
-              <a:rPr lang="en-US" dirty="0" err="1">
-                <a:latin typeface="Consolas" panose="020B0609020204030204" pitchFamily="49" charset="0"/>
-                <a:cs typeface="Consolas" panose="020B0609020204030204" pitchFamily="49" charset="0"/>
-              </a:rPr>
-              <a:t>typings</a:t>
-            </a:r>
-            <a:endParaRPr lang="en-US" dirty="0">
-              <a:latin typeface="Consolas" panose="020B0609020204030204" pitchFamily="49" charset="0"/>
-              <a:cs typeface="Consolas" panose="020B0609020204030204" pitchFamily="49" charset="0"/>
-            </a:endParaRPr>
-          </a:p>
-          <a:p>
-            <a:pPr lvl="1"/>
-            <a:endParaRPr lang="en-US" dirty="0">
-              <a:latin typeface="Consolas" panose="020B0609020204030204" pitchFamily="49" charset="0"/>
-              <a:cs typeface="Consolas" panose="020B0609020204030204" pitchFamily="49" charset="0"/>
-            </a:endParaRPr>
-          </a:p>
-          <a:p>
-            <a:r>
-              <a:rPr lang="en-US" dirty="0">
-                <a:latin typeface="Consolas" panose="020B0609020204030204" pitchFamily="49" charset="0"/>
-                <a:cs typeface="Consolas" panose="020B0609020204030204" pitchFamily="49" charset="0"/>
-              </a:rPr>
-              <a:t>*.d.ts files provide metadata to editor</a:t>
-            </a:r>
-          </a:p>
-          <a:p>
-            <a:pPr lvl="1"/>
-            <a:r>
-              <a:rPr lang="en-US" dirty="0">
-                <a:latin typeface="Consolas" panose="020B0609020204030204" pitchFamily="49" charset="0"/>
-                <a:cs typeface="Consolas" panose="020B0609020204030204" pitchFamily="49" charset="0"/>
-              </a:rPr>
-              <a:t>angular.d.ts, jquery.d.ts, etc.</a:t>
-            </a:r>
-          </a:p>
-        </p:txBody>
-      </p:sp>
-      <p:sp>
-        <p:nvSpPr>
-          <p:cNvPr id="4" name="Slide Number Placeholder 3"/>
-          <p:cNvSpPr>
-            <a:spLocks noGrp="1"/>
-          </p:cNvSpPr>
-          <p:nvPr>
-            <p:ph type="sldNum" sz="quarter" idx="12"/>
-          </p:nvPr>
-        </p:nvSpPr>
-        <p:spPr/>
-        <p:txBody>
-          <a:bodyPr/>
-          <a:lstStyle/>
-          <a:p>
-            <a:fld id="{CA6404EB-EC22-4A9F-B979-51DB938C35B6}" type="slidenum">
-              <a:rPr lang="en-US" smtClean="0"/>
-              <a:t>15</a:t>
-            </a:fld>
-            <a:endParaRPr lang="en-US" dirty="0"/>
-          </a:p>
-        </p:txBody>
-      </p:sp>
     </p:spTree>
     <p:extLst>
       <p:ext uri="{BB962C8B-B14F-4D97-AF65-F5344CB8AC3E}">
@@ -8115,83 +8121,9 @@
           <a:chExt cx="0" cy="0"/>
         </a:xfrm>
       </p:grpSpPr>
-      <p:sp>
-        <p:nvSpPr>
-          <p:cNvPr id="2" name="Title 1"/>
-          <p:cNvSpPr>
-            <a:spLocks noGrp="1"/>
-          </p:cNvSpPr>
-          <p:nvPr>
-            <p:ph type="title"/>
-          </p:nvPr>
-        </p:nvSpPr>
-        <p:spPr/>
-        <p:txBody>
-          <a:bodyPr/>
-          <a:lstStyle/>
-          <a:p>
-            <a:r>
-              <a:rPr lang="en-US" dirty="0"/>
-              <a:t>…or Enable IntelliSense via Editor</a:t>
-            </a:r>
-            <a:br>
-              <a:rPr lang="en-US" dirty="0"/>
-            </a:br>
-            <a:r>
-              <a:rPr lang="en-US" sz="2000" dirty="0"/>
-              <a:t>v0.10.9 and below</a:t>
-            </a:r>
-          </a:p>
-        </p:txBody>
-      </p:sp>
-      <p:sp>
-        <p:nvSpPr>
-          <p:cNvPr id="3" name="Content Placeholder 2"/>
-          <p:cNvSpPr>
-            <a:spLocks noGrp="1"/>
-          </p:cNvSpPr>
-          <p:nvPr>
-            <p:ph idx="1"/>
-          </p:nvPr>
-        </p:nvSpPr>
-        <p:spPr/>
-        <p:txBody>
-          <a:bodyPr/>
-          <a:lstStyle/>
-          <a:p>
-            <a:pPr marL="0" indent="0">
-              <a:buNone/>
-            </a:pPr>
-            <a:endParaRPr lang="en-US" dirty="0"/>
-          </a:p>
-        </p:txBody>
-      </p:sp>
-      <p:sp>
-        <p:nvSpPr>
-          <p:cNvPr id="4" name="Slide Number Placeholder 3"/>
-          <p:cNvSpPr>
-            <a:spLocks noGrp="1"/>
-          </p:cNvSpPr>
-          <p:nvPr>
-            <p:ph type="sldNum" sz="quarter" idx="12"/>
-          </p:nvPr>
-        </p:nvSpPr>
-        <p:spPr/>
-        <p:txBody>
-          <a:bodyPr/>
-          <a:lstStyle/>
-          <a:p>
-            <a:fld id="{CA6404EB-EC22-4A9F-B979-51DB938C35B6}" type="slidenum">
-              <a:rPr lang="en-US" smtClean="0"/>
-              <a:t>18</a:t>
-            </a:fld>
-            <a:endParaRPr lang="en-US" dirty="0"/>
-          </a:p>
-        </p:txBody>
-      </p:sp>
       <p:pic>
         <p:nvPicPr>
-          <p:cNvPr id="5" name="Picture 4"/>
+          <p:cNvPr id="6" name="Picture 5"/>
           <p:cNvPicPr>
             <a:picLocks noChangeAspect="1"/>
           </p:cNvPicPr>
@@ -8205,18 +8137,92 @@
         </p:blipFill>
         <p:spPr>
           <a:xfrm>
-            <a:off x="623887" y="1633537"/>
-            <a:ext cx="10944225" cy="3590925"/>
+            <a:off x="677335" y="1438164"/>
+            <a:ext cx="9637496" cy="5038835"/>
           </a:xfrm>
           <a:prstGeom prst="rect">
             <a:avLst/>
           </a:prstGeom>
+          <a:effectLst>
+            <a:outerShdw blurRad="63500" sx="102000" sy="102000" algn="ctr" rotWithShape="0">
+              <a:prstClr val="black">
+                <a:alpha val="40000"/>
+              </a:prstClr>
+            </a:outerShdw>
+          </a:effectLst>
         </p:spPr>
       </p:pic>
+      <p:sp>
+        <p:nvSpPr>
+          <p:cNvPr id="2" name="Title 1"/>
+          <p:cNvSpPr>
+            <a:spLocks noGrp="1"/>
+          </p:cNvSpPr>
+          <p:nvPr>
+            <p:ph type="title"/>
+          </p:nvPr>
+        </p:nvSpPr>
+        <p:spPr/>
+        <p:txBody>
+          <a:bodyPr/>
+          <a:lstStyle/>
+          <a:p>
+            <a:r>
+              <a:rPr lang="en-US" dirty="0"/>
+              <a:t>IntelliSense in Action</a:t>
+            </a:r>
+          </a:p>
+        </p:txBody>
+      </p:sp>
+      <p:sp>
+        <p:nvSpPr>
+          <p:cNvPr id="3" name="Content Placeholder 2"/>
+          <p:cNvSpPr>
+            <a:spLocks noGrp="1"/>
+          </p:cNvSpPr>
+          <p:nvPr>
+            <p:ph idx="1"/>
+          </p:nvPr>
+        </p:nvSpPr>
+        <p:spPr/>
+        <p:txBody>
+          <a:bodyPr/>
+          <a:lstStyle/>
+          <a:p>
+            <a:pPr marL="0" indent="0">
+              <a:buNone/>
+            </a:pPr>
+            <a:endParaRPr lang="en-US" dirty="0"/>
+          </a:p>
+        </p:txBody>
+      </p:sp>
+      <p:sp>
+        <p:nvSpPr>
+          <p:cNvPr id="4" name="Slide Number Placeholder 3"/>
+          <p:cNvSpPr>
+            <a:spLocks noGrp="1"/>
+          </p:cNvSpPr>
+          <p:nvPr>
+            <p:ph type="sldNum" sz="quarter" idx="12"/>
+          </p:nvPr>
+        </p:nvSpPr>
+        <p:spPr/>
+        <p:txBody>
+          <a:bodyPr/>
+          <a:lstStyle/>
+          <a:p>
+            <a:fld id="{CA6404EB-EC22-4A9F-B979-51DB938C35B6}" type="slidenum">
+              <a:rPr lang="en-US" smtClean="0"/>
+              <a:t>18</a:t>
+            </a:fld>
+            <a:endParaRPr lang="en-US" dirty="0"/>
+          </a:p>
+        </p:txBody>
+      </p:sp>
     </p:spTree>
     <p:extLst>
       <p:ext uri="{BB962C8B-B14F-4D97-AF65-F5344CB8AC3E}">
-        <p14:creationId xmlns:p14="http://schemas.microsoft.com/office/powerpoint/2010/main" val="2889530730"/>
+        <p14:creationId xmlns:p14="http://schemas.microsoft.com/office/powerpoint/2010/main" val="3564851363"/>
       </p:ext>
     </p:extLst>
   </p:cSld>
@@ -8257,7 +8263,38 @@
       </p:grpSpPr>
       <p:sp>
         <p:nvSpPr>
-          <p:cNvPr id="2" name="Title 1"/>
+          <p:cNvPr id="8" name="TextBox 7"/>
+          <p:cNvSpPr txBox="1"/>
+          <p:nvPr/>
+        </p:nvSpPr>
+        <p:spPr>
+          <a:xfrm>
+            <a:off x="677334" y="2844716"/>
+            <a:ext cx="9364590" cy="769441"/>
+          </a:xfrm>
+          <a:prstGeom prst="rect">
+            <a:avLst/>
+          </a:prstGeom>
+          <a:noFill/>
+        </p:spPr>
+        <p:txBody>
+          <a:bodyPr wrap="square" rtlCol="0">
+            <a:spAutoFit/>
+          </a:bodyPr>
+          <a:lstStyle/>
+          <a:p>
+            <a:r>
+              <a:rPr lang="en-US" sz="4400" dirty="0">
+                <a:latin typeface="Lucida Console" panose="020B0609040504020204" pitchFamily="49" charset="0"/>
+              </a:rPr>
+              <a:t>let demo =    +          ;</a:t>
+            </a:r>
+          </a:p>
+        </p:txBody>
+      </p:sp>
+      <p:sp>
+        <p:nvSpPr>
+          <p:cNvPr id="5" name="Title 4"/>
           <p:cNvSpPr>
             <a:spLocks noGrp="1"/>
           </p:cNvSpPr>
@@ -8265,6 +8302,33 @@
             <p:ph type="title"/>
           </p:nvPr>
         </p:nvSpPr>
+        <p:spPr>
+          <a:xfrm>
+            <a:off x="677335" y="2700867"/>
+            <a:ext cx="9196338" cy="1826581"/>
+          </a:xfrm>
+        </p:spPr>
+        <p:txBody>
+          <a:bodyPr/>
+          <a:lstStyle/>
+          <a:p>
+            <a:r>
+              <a:rPr lang="en-US" dirty="0"/>
+              <a:t>Demo</a:t>
+            </a:r>
+          </a:p>
+        </p:txBody>
+      </p:sp>
+      <p:sp>
+        <p:nvSpPr>
+          <p:cNvPr id="6" name="Text Placeholder 5"/>
+          <p:cNvSpPr>
+            <a:spLocks noGrp="1"/>
+          </p:cNvSpPr>
+          <p:nvPr>
+            <p:ph type="body" idx="1"/>
+          </p:nvPr>
+        </p:nvSpPr>
         <p:spPr/>
         <p:txBody>
           <a:bodyPr/>
@@ -8272,30 +8336,24 @@
           <a:p>
             <a:r>
               <a:rPr lang="en-US" dirty="0"/>
-              <a:t>IntelliSense in Action</a:t>
-            </a:r>
-          </a:p>
-        </p:txBody>
-      </p:sp>
-      <p:sp>
-        <p:nvSpPr>
-          <p:cNvPr id="3" name="Content Placeholder 2"/>
-          <p:cNvSpPr>
-            <a:spLocks noGrp="1"/>
-          </p:cNvSpPr>
-          <p:nvPr>
-            <p:ph idx="1"/>
-          </p:nvPr>
-        </p:nvSpPr>
-        <p:spPr/>
-        <p:txBody>
-          <a:bodyPr/>
-          <a:lstStyle/>
-          <a:p>
-            <a:pPr marL="0" indent="0">
-              <a:buNone/>
-            </a:pPr>
-            <a:endParaRPr lang="en-US" dirty="0"/>
+              <a:t>Enabling </a:t>
+            </a:r>
+            <a:r>
+              <a:rPr lang="en-US" dirty="0" err="1"/>
+              <a:t>CommonJS</a:t>
+            </a:r>
+            <a:r>
+              <a:rPr lang="en-US" dirty="0"/>
+              <a:t> &amp; </a:t>
+            </a:r>
+            <a:r>
+              <a:rPr lang="en-US" dirty="0" err="1"/>
+              <a:t>Webpack</a:t>
+            </a:r>
+            <a:r>
+              <a:rPr lang="en-US" dirty="0"/>
+              <a:t> Support</a:t>
+            </a:r>
           </a:p>
         </p:txBody>
       </p:sp>
@@ -8324,22 +8382,82 @@
       </p:sp>
       <p:pic>
         <p:nvPicPr>
-          <p:cNvPr id="5" name="Picture 4"/>
+          <p:cNvPr id="2" name="Picture 1"/>
           <p:cNvPicPr>
             <a:picLocks noChangeAspect="1"/>
           </p:cNvPicPr>
           <p:nvPr/>
         </p:nvPicPr>
         <p:blipFill>
-          <a:blip r:embed="rId2"/>
+          <a:blip r:embed="rId2">
+            <a:extLst>
+              <a:ext uri="{28A0092B-C50C-407E-A947-70E740481C1C}">
+                <a14:useLocalDpi xmlns:a14="http://schemas.microsoft.com/office/drawing/2010/main" val="0"/>
+              </a:ext>
+            </a:extLst>
+          </a:blip>
           <a:stretch>
             <a:fillRect/>
           </a:stretch>
         </p:blipFill>
         <p:spPr>
           <a:xfrm>
-            <a:off x="677334" y="1438164"/>
-            <a:ext cx="9233535" cy="5038835"/>
+            <a:off x="4325162" y="2806847"/>
+            <a:ext cx="950342" cy="950342"/>
+          </a:xfrm>
+          <a:prstGeom prst="rect">
+            <a:avLst/>
+          </a:prstGeom>
+        </p:spPr>
+      </p:pic>
+      <p:pic>
+        <p:nvPicPr>
+          <p:cNvPr id="9" name="Picture 8"/>
+          <p:cNvPicPr>
+            <a:picLocks noChangeAspect="1"/>
+          </p:cNvPicPr>
+          <p:nvPr/>
+        </p:nvPicPr>
+        <p:blipFill>
+          <a:blip r:embed="rId3">
+            <a:extLst>
+              <a:ext uri="{28A0092B-C50C-407E-A947-70E740481C1C}">
+                <a14:useLocalDpi xmlns:a14="http://schemas.microsoft.com/office/drawing/2010/main" val="0"/>
+              </a:ext>
+            </a:extLst>
+          </a:blip>
+          <a:stretch>
+            <a:fillRect/>
+          </a:stretch>
+        </p:blipFill>
+        <p:spPr>
+          <a:xfrm>
+            <a:off x="9134489" y="2806847"/>
+            <a:ext cx="950342" cy="950342"/>
+          </a:xfrm>
+          <a:prstGeom prst="rect">
+            <a:avLst/>
+          </a:prstGeom>
+        </p:spPr>
+      </p:pic>
+      <p:pic>
+        <p:nvPicPr>
+          <p:cNvPr id="7" name="Picture 6"/>
+          <p:cNvPicPr>
+            <a:picLocks noChangeAspect="1"/>
+          </p:cNvPicPr>
+          <p:nvPr/>
+        </p:nvPicPr>
+        <p:blipFill>
+          <a:blip r:embed="rId4"/>
+          <a:stretch>
+            <a:fillRect/>
+          </a:stretch>
+        </p:blipFill>
+        <p:spPr>
+          <a:xfrm>
+            <a:off x="5938576" y="2766373"/>
+            <a:ext cx="3256202" cy="1021485"/>
           </a:xfrm>
           <a:prstGeom prst="rect">
             <a:avLst/>
@@ -8349,7 +8467,7 @@
     </p:spTree>
     <p:extLst>
       <p:ext uri="{BB962C8B-B14F-4D97-AF65-F5344CB8AC3E}">
-        <p14:creationId xmlns:p14="http://schemas.microsoft.com/office/powerpoint/2010/main" val="3564851363"/>
+        <p14:creationId xmlns:p14="http://schemas.microsoft.com/office/powerpoint/2010/main" val="2690530629"/>
       </p:ext>
     </p:extLst>
   </p:cSld>
@@ -8652,125 +8770,6 @@
           <a:chExt cx="0" cy="0"/>
         </a:xfrm>
       </p:grpSpPr>
-      <p:sp>
-        <p:nvSpPr>
-          <p:cNvPr id="8" name="TextBox 7"/>
-          <p:cNvSpPr txBox="1"/>
-          <p:nvPr/>
-        </p:nvSpPr>
-        <p:spPr>
-          <a:xfrm>
-            <a:off x="677334" y="2844716"/>
-            <a:ext cx="9364590" cy="769441"/>
-          </a:xfrm>
-          <a:prstGeom prst="rect">
-            <a:avLst/>
-          </a:prstGeom>
-          <a:noFill/>
-        </p:spPr>
-        <p:txBody>
-          <a:bodyPr wrap="square" rtlCol="0">
-            <a:spAutoFit/>
-          </a:bodyPr>
-          <a:lstStyle/>
-          <a:p>
-            <a:r>
-              <a:rPr lang="en-US" sz="4400" dirty="0">
-                <a:latin typeface="Lucida Console" panose="020B0609040504020204" pitchFamily="49" charset="0"/>
-              </a:rPr>
-              <a:t>let demo =    +          ;</a:t>
-            </a:r>
-          </a:p>
-        </p:txBody>
-      </p:sp>
-      <p:sp>
-        <p:nvSpPr>
-          <p:cNvPr id="5" name="Title 4"/>
-          <p:cNvSpPr>
-            <a:spLocks noGrp="1"/>
-          </p:cNvSpPr>
-          <p:nvPr>
-            <p:ph type="title"/>
-          </p:nvPr>
-        </p:nvSpPr>
-        <p:spPr>
-          <a:xfrm>
-            <a:off x="677335" y="2700867"/>
-            <a:ext cx="9196338" cy="1826581"/>
-          </a:xfrm>
-        </p:spPr>
-        <p:txBody>
-          <a:bodyPr/>
-          <a:lstStyle/>
-          <a:p>
-            <a:r>
-              <a:rPr lang="en-US" dirty="0"/>
-              <a:t>Demo</a:t>
-            </a:r>
-          </a:p>
-        </p:txBody>
-      </p:sp>
-      <p:sp>
-        <p:nvSpPr>
-          <p:cNvPr id="6" name="Text Placeholder 5"/>
-          <p:cNvSpPr>
-            <a:spLocks noGrp="1"/>
-          </p:cNvSpPr>
-          <p:nvPr>
-            <p:ph type="body" idx="1"/>
-          </p:nvPr>
-        </p:nvSpPr>
-        <p:spPr/>
-        <p:txBody>
-          <a:bodyPr/>
-          <a:lstStyle/>
-          <a:p>
-            <a:r>
-              <a:rPr lang="en-US" dirty="0"/>
-              <a:t>Enabling </a:t>
-            </a:r>
-            <a:r>
-              <a:rPr lang="en-US" dirty="0" err="1"/>
-              <a:t>CommonJS</a:t>
-            </a:r>
-            <a:r>
-              <a:rPr lang="en-US" dirty="0"/>
-              <a:t> &amp; </a:t>
-            </a:r>
-            <a:r>
-              <a:rPr lang="en-US" dirty="0" err="1"/>
-              <a:t>Webpack</a:t>
-            </a:r>
-            <a:r>
-              <a:rPr lang="en-US" dirty="0"/>
-              <a:t> Support</a:t>
-            </a:r>
-          </a:p>
-        </p:txBody>
-      </p:sp>
-      <p:sp>
-        <p:nvSpPr>
-          <p:cNvPr id="4" name="Slide Number Placeholder 3"/>
-          <p:cNvSpPr>
-            <a:spLocks noGrp="1"/>
-          </p:cNvSpPr>
-          <p:nvPr>
-            <p:ph type="sldNum" sz="quarter" idx="12"/>
-          </p:nvPr>
-        </p:nvSpPr>
-        <p:spPr/>
-        <p:txBody>
-          <a:bodyPr/>
-          <a:lstStyle/>
-          <a:p>
-            <a:fld id="{CA6404EB-EC22-4A9F-B979-51DB938C35B6}" type="slidenum">
-              <a:rPr lang="en-US" smtClean="0"/>
-              <a:t>20</a:t>
-            </a:fld>
-            <a:endParaRPr lang="en-US" dirty="0"/>
-          </a:p>
-        </p:txBody>
-      </p:sp>
       <p:pic>
         <p:nvPicPr>
           <p:cNvPr id="2" name="Picture 1"/>
@@ -8780,123 +8779,21 @@
           <p:nvPr/>
         </p:nvPicPr>
         <p:blipFill>
-          <a:blip r:embed="rId2">
-            <a:extLst>
-              <a:ext uri="{28A0092B-C50C-407E-A947-70E740481C1C}">
-                <a14:useLocalDpi xmlns:a14="http://schemas.microsoft.com/office/drawing/2010/main" val="0"/>
-              </a:ext>
-            </a:extLst>
-          </a:blip>
+          <a:blip r:embed="rId2"/>
           <a:stretch>
             <a:fillRect/>
           </a:stretch>
         </p:blipFill>
         <p:spPr>
           <a:xfrm>
-            <a:off x="4325162" y="2806847"/>
-            <a:ext cx="950342" cy="950342"/>
+            <a:off x="4385164" y="160527"/>
+            <a:ext cx="11448414" cy="7531098"/>
           </a:xfrm>
           <a:prstGeom prst="rect">
             <a:avLst/>
           </a:prstGeom>
         </p:spPr>
       </p:pic>
-      <p:pic>
-        <p:nvPicPr>
-          <p:cNvPr id="9" name="Picture 8"/>
-          <p:cNvPicPr>
-            <a:picLocks noChangeAspect="1"/>
-          </p:cNvPicPr>
-          <p:nvPr/>
-        </p:nvPicPr>
-        <p:blipFill>
-          <a:blip r:embed="rId3">
-            <a:extLst>
-              <a:ext uri="{28A0092B-C50C-407E-A947-70E740481C1C}">
-                <a14:useLocalDpi xmlns:a14="http://schemas.microsoft.com/office/drawing/2010/main" val="0"/>
-              </a:ext>
-            </a:extLst>
-          </a:blip>
-          <a:stretch>
-            <a:fillRect/>
-          </a:stretch>
-        </p:blipFill>
-        <p:spPr>
-          <a:xfrm>
-            <a:off x="9134489" y="2806847"/>
-            <a:ext cx="950342" cy="950342"/>
-          </a:xfrm>
-          <a:prstGeom prst="rect">
-            <a:avLst/>
-          </a:prstGeom>
-        </p:spPr>
-      </p:pic>
-      <p:pic>
-        <p:nvPicPr>
-          <p:cNvPr id="7" name="Picture 6"/>
-          <p:cNvPicPr>
-            <a:picLocks noChangeAspect="1"/>
-          </p:cNvPicPr>
-          <p:nvPr/>
-        </p:nvPicPr>
-        <p:blipFill>
-          <a:blip r:embed="rId4"/>
-          <a:stretch>
-            <a:fillRect/>
-          </a:stretch>
-        </p:blipFill>
-        <p:spPr>
-          <a:xfrm>
-            <a:off x="5938576" y="2766373"/>
-            <a:ext cx="3256202" cy="1021485"/>
-          </a:xfrm>
-          <a:prstGeom prst="rect">
-            <a:avLst/>
-          </a:prstGeom>
-        </p:spPr>
-      </p:pic>
-    </p:spTree>
-    <p:extLst>
-      <p:ext uri="{BB962C8B-B14F-4D97-AF65-F5344CB8AC3E}">
-        <p14:creationId xmlns:p14="http://schemas.microsoft.com/office/powerpoint/2010/main" val="2690530629"/>
-      </p:ext>
-    </p:extLst>
-  </p:cSld>
-  <p:clrMapOvr>
-    <a:masterClrMapping/>
-  </p:clrMapOvr>
-  <mc:AlternateContent xmlns:mc="http://schemas.openxmlformats.org/markup-compatibility/2006" xmlns:p14="http://schemas.microsoft.com/office/powerpoint/2010/main">
-    <mc:Choice Requires="p14">
-      <p:transition p14:dur="250">
-        <p:fade/>
-      </p:transition>
-    </mc:Choice>
-    <mc:Fallback xmlns="">
-      <p:transition>
-        <p:fade/>
-      </p:transition>
-    </mc:Fallback>
-  </mc:AlternateContent>
-</p:sld>
-</file>
-
-<file path=ppt/slides/slide21.xml><?xml version="1.0" encoding="utf-8"?>
-<p:sld xmlns:a="http://schemas.openxmlformats.org/drawingml/2006/main" xmlns:r="http://schemas.openxmlformats.org/officeDocument/2006/relationships" xmlns:p="http://schemas.openxmlformats.org/presentationml/2006/main">
-  <p:cSld>
-    <p:spTree>
-      <p:nvGrpSpPr>
-        <p:cNvPr id="1" name=""/>
-        <p:cNvGrpSpPr/>
-        <p:nvPr/>
-      </p:nvGrpSpPr>
-      <p:grpSpPr>
-        <a:xfrm>
-          <a:off x="0" y="0"/>
-          <a:ext cx="0" cy="0"/>
-          <a:chOff x="0" y="0"/>
-          <a:chExt cx="0" cy="0"/>
-        </a:xfrm>
-      </p:grpSpPr>
       <p:sp>
         <p:nvSpPr>
           <p:cNvPr id="8" name="Title 7"/>
@@ -9036,76 +8933,58 @@
           <a:p>
             <a:fld id="{CA6404EB-EC22-4A9F-B979-51DB938C35B6}" type="slidenum">
               <a:rPr lang="en-US" smtClean="0"/>
-              <a:t>21</a:t>
+              <a:t>20</a:t>
             </a:fld>
             <a:endParaRPr lang="en-US" dirty="0"/>
           </a:p>
         </p:txBody>
       </p:sp>
-      <p:pic>
-        <p:nvPicPr>
-          <p:cNvPr id="3074" name="Picture 2"/>
-          <p:cNvPicPr>
-            <a:picLocks noChangeAspect="1" noChangeArrowheads="1"/>
-          </p:cNvPicPr>
+      <p:sp>
+        <p:nvSpPr>
+          <p:cNvPr id="7" name="Rectangle 6"/>
+          <p:cNvSpPr/>
           <p:nvPr/>
-        </p:nvPicPr>
-        <p:blipFill>
-          <a:blip r:embed="rId2">
-            <a:extLst>
-              <a:ext uri="{28A0092B-C50C-407E-A947-70E740481C1C}">
-                <a14:useLocalDpi xmlns:a14="http://schemas.microsoft.com/office/drawing/2010/main" val="0"/>
-              </a:ext>
-            </a:extLst>
-          </a:blip>
-          <a:srcRect/>
-          <a:stretch>
-            <a:fillRect/>
-          </a:stretch>
-        </p:blipFill>
-        <p:spPr bwMode="auto">
+        </p:nvSpPr>
+        <p:spPr>
           <a:xfrm>
-            <a:off x="5101444" y="160527"/>
-            <a:ext cx="6486525" cy="6543675"/>
+            <a:off x="7520704" y="609600"/>
+            <a:ext cx="1067497" cy="2415540"/>
           </a:xfrm>
           <a:prstGeom prst="rect">
             <a:avLst/>
           </a:prstGeom>
           <a:noFill/>
-          <a:ln>
-            <a:noFill/>
+          <a:ln w="38100">
+            <a:solidFill>
+              <a:schemeClr val="tx2"/>
+            </a:solidFill>
           </a:ln>
-          <a:effectLst/>
-          <a:extLst>
-            <a:ext uri="{909E8E84-426E-40DD-AFC4-6F175D3DCCD1}">
-              <a14:hiddenFill xmlns:a14="http://schemas.microsoft.com/office/drawing/2010/main">
-                <a:solidFill>
-                  <a:schemeClr val="accent1"/>
-                </a:solidFill>
-              </a14:hiddenFill>
-            </a:ext>
-            <a:ext uri="{91240B29-F687-4F45-9708-019B960494DF}">
-              <a14:hiddenLine xmlns:a14="http://schemas.microsoft.com/office/drawing/2010/main" w="9525">
-                <a:solidFill>
-                  <a:schemeClr val="tx1"/>
-                </a:solidFill>
-                <a:miter lim="800000"/>
-                <a:headEnd/>
-                <a:tailEnd/>
-              </a14:hiddenLine>
-            </a:ext>
-            <a:ext uri="{AF507438-7753-43E0-B8FC-AC1667EBCBE1}">
-              <a14:hiddenEffects xmlns:a14="http://schemas.microsoft.com/office/drawing/2010/main">
-                <a:effectLst>
-                  <a:outerShdw dist="35921" dir="2700000" algn="ctr" rotWithShape="0">
-                    <a:schemeClr val="bg2"/>
-                  </a:outerShdw>
-                </a:effectLst>
-              </a14:hiddenEffects>
-            </a:ext>
-          </a:extLst>
         </p:spPr>
-      </p:pic>
+        <p:style>
+          <a:lnRef idx="2">
+            <a:schemeClr val="accent1">
+              <a:shade val="50000"/>
+            </a:schemeClr>
+          </a:lnRef>
+          <a:fillRef idx="1">
+            <a:schemeClr val="accent1"/>
+          </a:fillRef>
+          <a:effectRef idx="0">
+            <a:schemeClr val="accent1"/>
+          </a:effectRef>
+          <a:fontRef idx="minor">
+            <a:schemeClr val="lt1"/>
+          </a:fontRef>
+        </p:style>
+        <p:txBody>
+          <a:bodyPr rtlCol="0" anchor="ctr"/>
+          <a:lstStyle/>
+          <a:p>
+            <a:pPr algn="ctr"/>
+            <a:endParaRPr lang="en-US"/>
+          </a:p>
+        </p:txBody>
+      </p:sp>
       <p:sp>
         <p:nvSpPr>
           <p:cNvPr id="10" name="Right Arrow 9"/>
@@ -9114,8 +8993,8 @@
         </p:nvSpPr>
         <p:spPr>
           <a:xfrm rot="20872969">
-            <a:off x="3171670" y="1731600"/>
-            <a:ext cx="5023471" cy="641445"/>
+            <a:off x="2597099" y="1792240"/>
+            <a:ext cx="4910990" cy="641445"/>
           </a:xfrm>
           <a:prstGeom prst="rightArrow">
             <a:avLst/>
@@ -9155,52 +9034,6 @@
               <a:rPr lang="en-US" dirty="0"/>
               <a:t>Tasks: Run Task</a:t>
             </a:r>
-          </a:p>
-        </p:txBody>
-      </p:sp>
-      <p:sp>
-        <p:nvSpPr>
-          <p:cNvPr id="7" name="Rectangle 6"/>
-          <p:cNvSpPr/>
-          <p:nvPr/>
-        </p:nvSpPr>
-        <p:spPr>
-          <a:xfrm>
-            <a:off x="8206505" y="204072"/>
-            <a:ext cx="823196" cy="2054716"/>
-          </a:xfrm>
-          <a:prstGeom prst="rect">
-            <a:avLst/>
-          </a:prstGeom>
-          <a:noFill/>
-          <a:ln w="38100">
-            <a:solidFill>
-              <a:schemeClr val="bg1"/>
-            </a:solidFill>
-          </a:ln>
-        </p:spPr>
-        <p:style>
-          <a:lnRef idx="2">
-            <a:schemeClr val="accent1">
-              <a:shade val="50000"/>
-            </a:schemeClr>
-          </a:lnRef>
-          <a:fillRef idx="1">
-            <a:schemeClr val="accent1"/>
-          </a:fillRef>
-          <a:effectRef idx="0">
-            <a:schemeClr val="accent1"/>
-          </a:effectRef>
-          <a:fontRef idx="minor">
-            <a:schemeClr val="lt1"/>
-          </a:fontRef>
-        </p:style>
-        <p:txBody>
-          <a:bodyPr rtlCol="0" anchor="ctr"/>
-          <a:lstStyle/>
-          <a:p>
-            <a:pPr algn="ctr"/>
-            <a:endParaRPr lang="en-US"/>
           </a:p>
         </p:txBody>
       </p:sp>
@@ -9328,14 +9161,14 @@
       </p:par>
     </p:tnLst>
     <p:bldLst>
+      <p:bldP spid="7" grpId="0" animBg="1"/>
       <p:bldP spid="10" grpId="0" animBg="1"/>
-      <p:bldP spid="7" grpId="0" animBg="1"/>
     </p:bldLst>
   </p:timing>
 </p:sld>
 </file>
 
-<file path=ppt/slides/slide22.xml><?xml version="1.0" encoding="utf-8"?>
+<file path=ppt/slides/slide21.xml><?xml version="1.0" encoding="utf-8"?>
 <p:sld xmlns:a="http://schemas.openxmlformats.org/drawingml/2006/main" xmlns:r="http://schemas.openxmlformats.org/officeDocument/2006/relationships" xmlns:p="http://schemas.openxmlformats.org/presentationml/2006/main">
   <p:cSld>
     <p:spTree>
@@ -9352,76 +9185,9 @@
           <a:chExt cx="0" cy="0"/>
         </a:xfrm>
       </p:grpSpPr>
-      <p:sp>
-        <p:nvSpPr>
-          <p:cNvPr id="2" name="Title 1"/>
-          <p:cNvSpPr>
-            <a:spLocks noGrp="1"/>
-          </p:cNvSpPr>
-          <p:nvPr>
-            <p:ph type="title"/>
-          </p:nvPr>
-        </p:nvSpPr>
-        <p:spPr/>
-        <p:txBody>
-          <a:bodyPr/>
-          <a:lstStyle/>
-          <a:p>
-            <a:r>
-              <a:rPr lang="en-US" dirty="0"/>
-              <a:t>Task Output</a:t>
-            </a:r>
-          </a:p>
-        </p:txBody>
-      </p:sp>
-      <p:sp>
-        <p:nvSpPr>
-          <p:cNvPr id="3" name="Content Placeholder 2"/>
-          <p:cNvSpPr>
-            <a:spLocks noGrp="1"/>
-          </p:cNvSpPr>
-          <p:nvPr>
-            <p:ph idx="1"/>
-          </p:nvPr>
-        </p:nvSpPr>
-        <p:spPr/>
-        <p:txBody>
-          <a:bodyPr/>
-          <a:lstStyle/>
-          <a:p>
-            <a:pPr marL="0" indent="0">
-              <a:buNone/>
-            </a:pPr>
-            <a:endParaRPr lang="en-US" dirty="0"/>
-          </a:p>
-        </p:txBody>
-      </p:sp>
-      <p:sp>
-        <p:nvSpPr>
-          <p:cNvPr id="4" name="Slide Number Placeholder 3"/>
-          <p:cNvSpPr>
-            <a:spLocks noGrp="1"/>
-          </p:cNvSpPr>
-          <p:nvPr>
-            <p:ph type="sldNum" sz="quarter" idx="12"/>
-          </p:nvPr>
-        </p:nvSpPr>
-        <p:spPr/>
-        <p:txBody>
-          <a:bodyPr/>
-          <a:lstStyle/>
-          <a:p>
-            <a:fld id="{CA6404EB-EC22-4A9F-B979-51DB938C35B6}" type="slidenum">
-              <a:rPr lang="en-US" smtClean="0"/>
-              <a:t>22</a:t>
-            </a:fld>
-            <a:endParaRPr lang="en-US" dirty="0"/>
-          </a:p>
-        </p:txBody>
-      </p:sp>
       <p:pic>
         <p:nvPicPr>
-          <p:cNvPr id="6" name="Picture 5"/>
+          <p:cNvPr id="5" name="Picture 4"/>
           <p:cNvPicPr>
             <a:picLocks noChangeAspect="1"/>
           </p:cNvPicPr>
@@ -9435,14 +9201,88 @@
         </p:blipFill>
         <p:spPr>
           <a:xfrm>
-            <a:off x="428368" y="1841500"/>
-            <a:ext cx="11585832" cy="3245183"/>
+            <a:off x="507712" y="1861820"/>
+            <a:ext cx="11427143" cy="3271105"/>
           </a:xfrm>
           <a:prstGeom prst="rect">
             <a:avLst/>
           </a:prstGeom>
+          <a:effectLst>
+            <a:outerShdw blurRad="63500" sx="102000" sy="102000" algn="ctr" rotWithShape="0">
+              <a:prstClr val="black">
+                <a:alpha val="40000"/>
+              </a:prstClr>
+            </a:outerShdw>
+          </a:effectLst>
         </p:spPr>
       </p:pic>
+      <p:sp>
+        <p:nvSpPr>
+          <p:cNvPr id="2" name="Title 1"/>
+          <p:cNvSpPr>
+            <a:spLocks noGrp="1"/>
+          </p:cNvSpPr>
+          <p:nvPr>
+            <p:ph type="title"/>
+          </p:nvPr>
+        </p:nvSpPr>
+        <p:spPr/>
+        <p:txBody>
+          <a:bodyPr/>
+          <a:lstStyle/>
+          <a:p>
+            <a:r>
+              <a:rPr lang="en-US" dirty="0"/>
+              <a:t>Task Output</a:t>
+            </a:r>
+          </a:p>
+        </p:txBody>
+      </p:sp>
+      <p:sp>
+        <p:nvSpPr>
+          <p:cNvPr id="3" name="Content Placeholder 2"/>
+          <p:cNvSpPr>
+            <a:spLocks noGrp="1"/>
+          </p:cNvSpPr>
+          <p:nvPr>
+            <p:ph idx="1"/>
+          </p:nvPr>
+        </p:nvSpPr>
+        <p:spPr/>
+        <p:txBody>
+          <a:bodyPr/>
+          <a:lstStyle/>
+          <a:p>
+            <a:pPr marL="0" indent="0">
+              <a:buNone/>
+            </a:pPr>
+            <a:endParaRPr lang="en-US" dirty="0"/>
+          </a:p>
+        </p:txBody>
+      </p:sp>
+      <p:sp>
+        <p:nvSpPr>
+          <p:cNvPr id="4" name="Slide Number Placeholder 3"/>
+          <p:cNvSpPr>
+            <a:spLocks noGrp="1"/>
+          </p:cNvSpPr>
+          <p:nvPr>
+            <p:ph type="sldNum" sz="quarter" idx="12"/>
+          </p:nvPr>
+        </p:nvSpPr>
+        <p:spPr/>
+        <p:txBody>
+          <a:bodyPr/>
+          <a:lstStyle/>
+          <a:p>
+            <a:fld id="{CA6404EB-EC22-4A9F-B979-51DB938C35B6}" type="slidenum">
+              <a:rPr lang="en-US" smtClean="0"/>
+              <a:t>21</a:t>
+            </a:fld>
+            <a:endParaRPr lang="en-US" dirty="0"/>
+          </a:p>
+        </p:txBody>
+      </p:sp>
     </p:spTree>
     <p:extLst>
       <p:ext uri="{BB962C8B-B14F-4D97-AF65-F5344CB8AC3E}">
@@ -9468,7 +9308,7 @@
 </p:sld>
 </file>
 
-<file path=ppt/slides/slide23.xml><?xml version="1.0" encoding="utf-8"?>
+<file path=ppt/slides/slide22.xml><?xml version="1.0" encoding="utf-8"?>
 <p:sld xmlns:a="http://schemas.openxmlformats.org/drawingml/2006/main" xmlns:r="http://schemas.openxmlformats.org/officeDocument/2006/relationships" xmlns:p="http://schemas.openxmlformats.org/presentationml/2006/main">
   <p:cSld>
     <p:spTree>
@@ -9582,7 +9422,7 @@
           <a:p>
             <a:fld id="{CA6404EB-EC22-4A9F-B979-51DB938C35B6}" type="slidenum">
               <a:rPr lang="en-US" smtClean="0"/>
-              <a:t>23</a:t>
+              <a:t>22</a:t>
             </a:fld>
             <a:endParaRPr lang="en-US" dirty="0"/>
           </a:p>
@@ -9703,7 +9543,7 @@
 </p:sld>
 </file>
 
-<file path=ppt/slides/slide24.xml><?xml version="1.0" encoding="utf-8"?>
+<file path=ppt/slides/slide23.xml><?xml version="1.0" encoding="utf-8"?>
 <p:sld xmlns:a="http://schemas.openxmlformats.org/drawingml/2006/main" xmlns:r="http://schemas.openxmlformats.org/officeDocument/2006/relationships" xmlns:p="http://schemas.openxmlformats.org/presentationml/2006/main">
   <p:cSld>
     <p:spTree>
@@ -9895,7 +9735,7 @@
           <a:p>
             <a:fld id="{CA6404EB-EC22-4A9F-B979-51DB938C35B6}" type="slidenum">
               <a:rPr lang="en-US" smtClean="0"/>
-              <a:t>24</a:t>
+              <a:t>23</a:t>
             </a:fld>
             <a:endParaRPr lang="en-US" dirty="0"/>
           </a:p>
@@ -10008,7 +9848,7 @@
 </p:sld>
 </file>
 
-<file path=ppt/slides/slide25.xml><?xml version="1.0" encoding="utf-8"?>
+<file path=ppt/slides/slide24.xml><?xml version="1.0" encoding="utf-8"?>
 <p:sld xmlns:a="http://schemas.openxmlformats.org/drawingml/2006/main" xmlns:r="http://schemas.openxmlformats.org/officeDocument/2006/relationships" xmlns:p="http://schemas.openxmlformats.org/presentationml/2006/main">
   <p:cSld>
     <p:spTree>
@@ -10126,7 +9966,7 @@
           <a:p>
             <a:fld id="{CA6404EB-EC22-4A9F-B979-51DB938C35B6}" type="slidenum">
               <a:rPr lang="en-US" smtClean="0"/>
-              <a:t>25</a:t>
+              <a:t>24</a:t>
             </a:fld>
             <a:endParaRPr lang="en-US" dirty="0"/>
           </a:p>
@@ -10157,7 +9997,7 @@
 </p:sld>
 </file>
 
-<file path=ppt/slides/slide26.xml><?xml version="1.0" encoding="utf-8"?>
+<file path=ppt/slides/slide25.xml><?xml version="1.0" encoding="utf-8"?>
 <p:sld xmlns:a="http://schemas.openxmlformats.org/drawingml/2006/main" xmlns:r="http://schemas.openxmlformats.org/officeDocument/2006/relationships" xmlns:p="http://schemas.openxmlformats.org/presentationml/2006/main">
   <p:cSld>
     <p:spTree>
@@ -10271,7 +10111,7 @@
           <a:p>
             <a:fld id="{CA6404EB-EC22-4A9F-B979-51DB938C35B6}" type="slidenum">
               <a:rPr lang="en-US" smtClean="0"/>
-              <a:t>26</a:t>
+              <a:t>25</a:t>
             </a:fld>
             <a:endParaRPr lang="en-US" dirty="0"/>
           </a:p>
@@ -10392,7 +10232,7 @@
 </p:sld>
 </file>
 
-<file path=ppt/slides/slide27.xml><?xml version="1.0" encoding="utf-8"?>
+<file path=ppt/slides/slide26.xml><?xml version="1.0" encoding="utf-8"?>
 <p:sld xmlns:a="http://schemas.openxmlformats.org/drawingml/2006/main" xmlns:r="http://schemas.openxmlformats.org/officeDocument/2006/relationships" xmlns:p="http://schemas.openxmlformats.org/presentationml/2006/main">
   <p:cSld>
     <p:spTree>
@@ -10484,7 +10324,7 @@
           <a:p>
             <a:fld id="{CA6404EB-EC22-4A9F-B979-51DB938C35B6}" type="slidenum">
               <a:rPr lang="en-US" smtClean="0"/>
-              <a:t>27</a:t>
+              <a:t>26</a:t>
             </a:fld>
             <a:endParaRPr lang="en-US" dirty="0"/>
           </a:p>
@@ -10569,7 +10409,7 @@
 </p:sld>
 </file>
 
-<file path=ppt/slides/slide28.xml><?xml version="1.0" encoding="utf-8"?>
+<file path=ppt/slides/slide27.xml><?xml version="1.0" encoding="utf-8"?>
 <p:sld xmlns:a="http://schemas.openxmlformats.org/drawingml/2006/main" xmlns:r="http://schemas.openxmlformats.org/officeDocument/2006/relationships" xmlns:p="http://schemas.openxmlformats.org/presentationml/2006/main">
   <p:cSld>
     <p:spTree>
@@ -10730,7 +10570,7 @@
           <a:p>
             <a:fld id="{CA6404EB-EC22-4A9F-B979-51DB938C35B6}" type="slidenum">
               <a:rPr lang="en-US" smtClean="0"/>
-              <a:t>28</a:t>
+              <a:t>27</a:t>
             </a:fld>
             <a:endParaRPr lang="en-US" dirty="0"/>
           </a:p>
@@ -10761,7 +10601,7 @@
 </p:sld>
 </file>
 
-<file path=ppt/slides/slide29.xml><?xml version="1.0" encoding="utf-8"?>
+<file path=ppt/slides/slide28.xml><?xml version="1.0" encoding="utf-8"?>
 <p:sld xmlns:a="http://schemas.openxmlformats.org/drawingml/2006/main" xmlns:r="http://schemas.openxmlformats.org/officeDocument/2006/relationships" xmlns:p="http://schemas.openxmlformats.org/presentationml/2006/main">
   <p:cSld>
     <p:spTree>
@@ -10875,7 +10715,7 @@
           <a:p>
             <a:fld id="{CA6404EB-EC22-4A9F-B979-51DB938C35B6}" type="slidenum">
               <a:rPr lang="en-US" smtClean="0"/>
-              <a:t>29</a:t>
+              <a:t>28</a:t>
             </a:fld>
             <a:endParaRPr lang="en-US" dirty="0"/>
           </a:p>
@@ -10996,6 +10836,210 @@
 </p:sld>
 </file>
 
+<file path=ppt/slides/slide29.xml><?xml version="1.0" encoding="utf-8"?>
+<p:sld xmlns:a="http://schemas.openxmlformats.org/drawingml/2006/main" xmlns:r="http://schemas.openxmlformats.org/officeDocument/2006/relationships" xmlns:p="http://schemas.openxmlformats.org/presentationml/2006/main">
+  <p:cSld>
+    <p:spTree>
+      <p:nvGrpSpPr>
+        <p:cNvPr id="1" name=""/>
+        <p:cNvGrpSpPr/>
+        <p:nvPr/>
+      </p:nvGrpSpPr>
+      <p:grpSpPr>
+        <a:xfrm>
+          <a:off x="0" y="0"/>
+          <a:ext cx="0" cy="0"/>
+          <a:chOff x="0" y="0"/>
+          <a:chExt cx="0" cy="0"/>
+        </a:xfrm>
+      </p:grpSpPr>
+      <p:sp>
+        <p:nvSpPr>
+          <p:cNvPr id="2" name="Title 1"/>
+          <p:cNvSpPr>
+            <a:spLocks noGrp="1"/>
+          </p:cNvSpPr>
+          <p:nvPr>
+            <p:ph type="title"/>
+          </p:nvPr>
+        </p:nvSpPr>
+        <p:spPr/>
+        <p:txBody>
+          <a:bodyPr/>
+          <a:lstStyle/>
+          <a:p>
+            <a:r>
+              <a:rPr lang="en-US" dirty="0"/>
+              <a:t>Resources</a:t>
+            </a:r>
+          </a:p>
+        </p:txBody>
+      </p:sp>
+      <p:sp>
+        <p:nvSpPr>
+          <p:cNvPr id="3" name="Content Placeholder 2"/>
+          <p:cNvSpPr>
+            <a:spLocks noGrp="1"/>
+          </p:cNvSpPr>
+          <p:nvPr>
+            <p:ph idx="1"/>
+          </p:nvPr>
+        </p:nvSpPr>
+        <p:spPr/>
+        <p:txBody>
+          <a:bodyPr>
+            <a:normAutofit fontScale="92500" lnSpcReduction="10000"/>
+          </a:bodyPr>
+          <a:lstStyle/>
+          <a:p>
+            <a:r>
+              <a:rPr lang="en-US" dirty="0">
+                <a:hlinkClick r:id="rId2"/>
+              </a:rPr>
+              <a:t>Best of VS Code: Tips and Tricks</a:t>
+            </a:r>
+            <a:endParaRPr lang="en-US" dirty="0">
+              <a:hlinkClick r:id="rId3"/>
+            </a:endParaRPr>
+          </a:p>
+          <a:p>
+            <a:pPr lvl="1"/>
+            <a:r>
+              <a:rPr lang="en-US" dirty="0"/>
+              <a:t>Build 2016 session</a:t>
+            </a:r>
+          </a:p>
+          <a:p>
+            <a:endParaRPr lang="en-US" dirty="0">
+              <a:hlinkClick r:id="rId3"/>
+            </a:endParaRPr>
+          </a:p>
+          <a:p>
+            <a:r>
+              <a:rPr lang="en-US" dirty="0">
+                <a:hlinkClick r:id="rId4"/>
+              </a:rPr>
+              <a:t>VS Code Docs</a:t>
+            </a:r>
+            <a:endParaRPr lang="en-US" dirty="0"/>
+          </a:p>
+          <a:p>
+            <a:endParaRPr lang="en-US" dirty="0">
+              <a:hlinkClick r:id="rId3"/>
+            </a:endParaRPr>
+          </a:p>
+          <a:p>
+            <a:r>
+              <a:rPr lang="en-US" dirty="0">
+                <a:hlinkClick r:id="rId5"/>
+              </a:rPr>
+              <a:t>VS Code Source on GitHub</a:t>
+            </a:r>
+            <a:endParaRPr lang="en-US" dirty="0">
+              <a:hlinkClick r:id="rId3"/>
+            </a:endParaRPr>
+          </a:p>
+          <a:p>
+            <a:pPr marL="0" indent="0">
+              <a:buNone/>
+            </a:pPr>
+            <a:endParaRPr lang="en-US" dirty="0">
+              <a:hlinkClick r:id="rId3"/>
+            </a:endParaRPr>
+          </a:p>
+          <a:p>
+            <a:r>
+              <a:rPr lang="en-US" dirty="0">
+                <a:hlinkClick r:id="rId6"/>
+              </a:rPr>
+              <a:t>Visual Studio Code</a:t>
+            </a:r>
+            <a:endParaRPr lang="en-US" dirty="0"/>
+          </a:p>
+          <a:p>
+            <a:pPr lvl="1"/>
+            <a:r>
+              <a:rPr lang="en-US" dirty="0"/>
+              <a:t>John Papa, </a:t>
+            </a:r>
+            <a:r>
+              <a:rPr lang="en-US" dirty="0" err="1"/>
+              <a:t>Pluralsight</a:t>
+            </a:r>
+            <a:r>
+              <a:rPr lang="en-US" dirty="0"/>
+              <a:t> course</a:t>
+            </a:r>
+          </a:p>
+          <a:p>
+            <a:pPr lvl="1"/>
+            <a:endParaRPr lang="en-US" dirty="0"/>
+          </a:p>
+          <a:p>
+            <a:r>
+              <a:rPr lang="en-US" dirty="0">
+                <a:hlinkClick r:id="rId7"/>
+              </a:rPr>
+              <a:t>VS Code ES6 Sample Project</a:t>
+            </a:r>
+            <a:endParaRPr lang="en-US" dirty="0"/>
+          </a:p>
+          <a:p>
+            <a:pPr marL="0" indent="0">
+              <a:buNone/>
+            </a:pPr>
+            <a:endParaRPr lang="en-US" dirty="0"/>
+          </a:p>
+        </p:txBody>
+      </p:sp>
+      <p:sp>
+        <p:nvSpPr>
+          <p:cNvPr id="4" name="Slide Number Placeholder 3"/>
+          <p:cNvSpPr>
+            <a:spLocks noGrp="1"/>
+          </p:cNvSpPr>
+          <p:nvPr>
+            <p:ph type="sldNum" sz="quarter" idx="12"/>
+          </p:nvPr>
+        </p:nvSpPr>
+        <p:spPr/>
+        <p:txBody>
+          <a:bodyPr/>
+          <a:lstStyle/>
+          <a:p>
+            <a:fld id="{CA6404EB-EC22-4A9F-B979-51DB938C35B6}" type="slidenum">
+              <a:rPr lang="en-US" smtClean="0"/>
+              <a:t>29</a:t>
+            </a:fld>
+            <a:endParaRPr lang="en-US" dirty="0"/>
+          </a:p>
+        </p:txBody>
+      </p:sp>
+    </p:spTree>
+    <p:extLst>
+      <p:ext uri="{BB962C8B-B14F-4D97-AF65-F5344CB8AC3E}">
+        <p14:creationId xmlns:p14="http://schemas.microsoft.com/office/powerpoint/2010/main" val="3638863624"/>
+      </p:ext>
+    </p:extLst>
+  </p:cSld>
+  <p:clrMapOvr>
+    <a:masterClrMapping/>
+  </p:clrMapOvr>
+  <mc:AlternateContent xmlns:mc="http://schemas.openxmlformats.org/markup-compatibility/2006" xmlns:p14="http://schemas.microsoft.com/office/powerpoint/2010/main">
+    <mc:Choice Requires="p14">
+      <p:transition p14:dur="250">
+        <p:fade/>
+      </p:transition>
+    </mc:Choice>
+    <mc:Fallback xmlns="">
+      <p:transition>
+        <p:fade/>
+      </p:transition>
+    </mc:Fallback>
+  </mc:AlternateContent>
+</p:sld>
+</file>
+
 <file path=ppt/slides/slide3.xml><?xml version="1.0" encoding="utf-8"?>
 <p:sld xmlns:a="http://schemas.openxmlformats.org/drawingml/2006/main" xmlns:r="http://schemas.openxmlformats.org/officeDocument/2006/relationships" xmlns:p="http://schemas.openxmlformats.org/presentationml/2006/main">
   <p:cSld>
@@ -11013,6 +11057,36 @@
           <a:chExt cx="0" cy="0"/>
         </a:xfrm>
       </p:grpSpPr>
+      <p:pic>
+        <p:nvPicPr>
+          <p:cNvPr id="15" name="Picture 14"/>
+          <p:cNvPicPr>
+            <a:picLocks noChangeAspect="1"/>
+          </p:cNvPicPr>
+          <p:nvPr/>
+        </p:nvPicPr>
+        <p:blipFill>
+          <a:blip r:embed="rId2" cstate="print">
+            <a:extLst>
+              <a:ext uri="{28A0092B-C50C-407E-A947-70E740481C1C}">
+                <a14:useLocalDpi xmlns:a14="http://schemas.microsoft.com/office/drawing/2010/main" val="0"/>
+              </a:ext>
+            </a:extLst>
+          </a:blip>
+          <a:stretch>
+            <a:fillRect/>
+          </a:stretch>
+        </p:blipFill>
+        <p:spPr>
+          <a:xfrm>
+            <a:off x="3108547" y="2740384"/>
+            <a:ext cx="719875" cy="719875"/>
+          </a:xfrm>
+          <a:prstGeom prst="rect">
+            <a:avLst/>
+          </a:prstGeom>
+        </p:spPr>
+      </p:pic>
       <p:sp>
         <p:nvSpPr>
           <p:cNvPr id="6" name="Title 5"/>
@@ -11047,23 +11121,36 @@
         </p:nvSpPr>
         <p:spPr/>
         <p:txBody>
-          <a:bodyPr/>
-          <a:lstStyle/>
-          <a:p>
-            <a:r>
-              <a:rPr lang="en-US" dirty="0"/>
-              <a:t>An editor, not an IDE</a:t>
-            </a:r>
-          </a:p>
-          <a:p>
-            <a:pPr lvl="1"/>
+          <a:bodyPr>
+            <a:normAutofit fontScale="92500" lnSpcReduction="10000"/>
+          </a:bodyPr>
+          <a:lstStyle/>
+          <a:p>
+            <a:pPr marL="0" indent="0">
+              <a:buNone/>
+            </a:pPr>
+            <a:endParaRPr lang="en-US" dirty="0"/>
+          </a:p>
+          <a:p>
+            <a:endParaRPr lang="en-US" dirty="0"/>
+          </a:p>
+          <a:p>
+            <a:endParaRPr lang="en-US" dirty="0"/>
+          </a:p>
+          <a:p>
+            <a:endParaRPr lang="en-US" dirty="0"/>
+          </a:p>
+          <a:p>
+            <a:endParaRPr lang="en-US" dirty="0"/>
+          </a:p>
+          <a:p>
             <a:r>
               <a:rPr lang="en-US" dirty="0"/>
               <a:t>Based on GitHub’s </a:t>
             </a:r>
             <a:r>
               <a:rPr lang="en-US" dirty="0">
-                <a:hlinkClick r:id="rId2"/>
+                <a:hlinkClick r:id="rId3"/>
               </a:rPr>
               <a:t>Electron</a:t>
             </a:r>
@@ -11073,21 +11160,20 @@
             </a:r>
           </a:p>
           <a:p>
-            <a:pPr lvl="1"/>
             <a:r>
               <a:rPr lang="en-US" dirty="0"/>
               <a:t>Designed by engineers who created:</a:t>
             </a:r>
           </a:p>
           <a:p>
-            <a:pPr lvl="2"/>
+            <a:pPr lvl="1"/>
             <a:r>
               <a:rPr lang="en-US" dirty="0"/>
               <a:t>Eclipse @ IBM</a:t>
             </a:r>
           </a:p>
           <a:p>
-            <a:pPr lvl="2"/>
+            <a:pPr lvl="1"/>
             <a:r>
               <a:rPr lang="en-US" dirty="0"/>
               <a:t>Monaco @ Microsoft</a:t>
@@ -11136,7 +11222,7 @@
           <p:nvPr/>
         </p:nvPicPr>
         <p:blipFill>
-          <a:blip r:embed="rId3">
+          <a:blip r:embed="rId4">
             <a:extLst>
               <a:ext uri="{28A0092B-C50C-407E-A947-70E740481C1C}">
                 <a14:useLocalDpi xmlns:a14="http://schemas.microsoft.com/office/drawing/2010/main" val="0"/>
@@ -11150,7 +11236,7 @@
         </p:blipFill>
         <p:spPr bwMode="auto">
           <a:xfrm>
-            <a:off x="1257699" y="4884757"/>
+            <a:off x="3845161" y="5804179"/>
             <a:ext cx="2381250" cy="581026"/>
           </a:xfrm>
           <a:prstGeom prst="rect">
@@ -11168,6 +11254,582 @@
           </a:extLst>
         </p:spPr>
       </p:pic>
+      <p:grpSp>
+        <p:nvGrpSpPr>
+          <p:cNvPr id="8" name="Group 7"/>
+          <p:cNvGrpSpPr/>
+          <p:nvPr/>
+        </p:nvGrpSpPr>
+        <p:grpSpPr>
+          <a:xfrm>
+            <a:off x="-69982" y="1714155"/>
+            <a:ext cx="9646062" cy="576976"/>
+            <a:chOff x="646137" y="2659062"/>
+            <a:chExt cx="10836557" cy="876757"/>
+          </a:xfrm>
+        </p:grpSpPr>
+        <p:cxnSp>
+          <p:nvCxnSpPr>
+            <p:cNvPr id="12" name="Straight Arrow Connector 11"/>
+            <p:cNvCxnSpPr/>
+            <p:nvPr/>
+          </p:nvCxnSpPr>
+          <p:spPr>
+            <a:xfrm>
+              <a:off x="1493837" y="2659062"/>
+              <a:ext cx="9430690" cy="0"/>
+            </a:xfrm>
+            <a:prstGeom prst="straightConnector1">
+              <a:avLst/>
+            </a:prstGeom>
+            <a:ln w="63500">
+              <a:solidFill>
+                <a:schemeClr val="tx1"/>
+              </a:solidFill>
+              <a:headEnd type="oval"/>
+              <a:tailEnd type="oval"/>
+            </a:ln>
+          </p:spPr>
+          <p:style>
+            <a:lnRef idx="1">
+              <a:schemeClr val="accent1"/>
+            </a:lnRef>
+            <a:fillRef idx="0">
+              <a:schemeClr val="accent1"/>
+            </a:fillRef>
+            <a:effectRef idx="0">
+              <a:schemeClr val="accent1"/>
+            </a:effectRef>
+            <a:fontRef idx="minor">
+              <a:schemeClr val="tx1"/>
+            </a:fontRef>
+          </p:style>
+        </p:cxnSp>
+        <p:sp>
+          <p:nvSpPr>
+            <p:cNvPr id="13" name="TextBox 6"/>
+            <p:cNvSpPr txBox="1"/>
+            <p:nvPr/>
+          </p:nvSpPr>
+          <p:spPr>
+            <a:xfrm>
+              <a:off x="10624446" y="2907955"/>
+              <a:ext cx="858248" cy="627864"/>
+            </a:xfrm>
+            <a:prstGeom prst="rect">
+              <a:avLst/>
+            </a:prstGeom>
+            <a:noFill/>
+          </p:spPr>
+          <p:txBody>
+            <a:bodyPr wrap="none" lIns="182880" tIns="146304" rIns="182880" bIns="146304" rtlCol="0">
+              <a:spAutoFit/>
+            </a:bodyPr>
+            <a:lstStyle>
+              <a:defPPr>
+                <a:defRPr lang="en-US"/>
+              </a:defPPr>
+              <a:lvl1pPr marL="0" algn="l" defTabSz="932742" rtl="0" eaLnBrk="1" latinLnBrk="0" hangingPunct="1">
+                <a:defRPr sz="1800" kern="1200">
+                  <a:solidFill>
+                    <a:schemeClr val="tx1"/>
+                  </a:solidFill>
+                  <a:latin typeface="+mn-lt"/>
+                  <a:ea typeface="+mn-ea"/>
+                  <a:cs typeface="+mn-cs"/>
+                </a:defRPr>
+              </a:lvl1pPr>
+              <a:lvl2pPr marL="466371" algn="l" defTabSz="932742" rtl="0" eaLnBrk="1" latinLnBrk="0" hangingPunct="1">
+                <a:defRPr sz="1800" kern="1200">
+                  <a:solidFill>
+                    <a:schemeClr val="tx1"/>
+                  </a:solidFill>
+                  <a:latin typeface="+mn-lt"/>
+                  <a:ea typeface="+mn-ea"/>
+                  <a:cs typeface="+mn-cs"/>
+                </a:defRPr>
+              </a:lvl2pPr>
+              <a:lvl3pPr marL="932742" algn="l" defTabSz="932742" rtl="0" eaLnBrk="1" latinLnBrk="0" hangingPunct="1">
+                <a:defRPr sz="1800" kern="1200">
+                  <a:solidFill>
+                    <a:schemeClr val="tx1"/>
+                  </a:solidFill>
+                  <a:latin typeface="+mn-lt"/>
+                  <a:ea typeface="+mn-ea"/>
+                  <a:cs typeface="+mn-cs"/>
+                </a:defRPr>
+              </a:lvl3pPr>
+              <a:lvl4pPr marL="1399113" algn="l" defTabSz="932742" rtl="0" eaLnBrk="1" latinLnBrk="0" hangingPunct="1">
+                <a:defRPr sz="1800" kern="1200">
+                  <a:solidFill>
+                    <a:schemeClr val="tx1"/>
+                  </a:solidFill>
+                  <a:latin typeface="+mn-lt"/>
+                  <a:ea typeface="+mn-ea"/>
+                  <a:cs typeface="+mn-cs"/>
+                </a:defRPr>
+              </a:lvl4pPr>
+              <a:lvl5pPr marL="1865484" algn="l" defTabSz="932742" rtl="0" eaLnBrk="1" latinLnBrk="0" hangingPunct="1">
+                <a:defRPr sz="1800" kern="1200">
+                  <a:solidFill>
+                    <a:schemeClr val="tx1"/>
+                  </a:solidFill>
+                  <a:latin typeface="+mn-lt"/>
+                  <a:ea typeface="+mn-ea"/>
+                  <a:cs typeface="+mn-cs"/>
+                </a:defRPr>
+              </a:lvl5pPr>
+              <a:lvl6pPr marL="2331856" algn="l" defTabSz="932742" rtl="0" eaLnBrk="1" latinLnBrk="0" hangingPunct="1">
+                <a:defRPr sz="1800" kern="1200">
+                  <a:solidFill>
+                    <a:schemeClr val="tx1"/>
+                  </a:solidFill>
+                  <a:latin typeface="+mn-lt"/>
+                  <a:ea typeface="+mn-ea"/>
+                  <a:cs typeface="+mn-cs"/>
+                </a:defRPr>
+              </a:lvl6pPr>
+              <a:lvl7pPr marL="2798226" algn="l" defTabSz="932742" rtl="0" eaLnBrk="1" latinLnBrk="0" hangingPunct="1">
+                <a:defRPr sz="1800" kern="1200">
+                  <a:solidFill>
+                    <a:schemeClr val="tx1"/>
+                  </a:solidFill>
+                  <a:latin typeface="+mn-lt"/>
+                  <a:ea typeface="+mn-ea"/>
+                  <a:cs typeface="+mn-cs"/>
+                </a:defRPr>
+              </a:lvl7pPr>
+              <a:lvl8pPr marL="3264597" algn="l" defTabSz="932742" rtl="0" eaLnBrk="1" latinLnBrk="0" hangingPunct="1">
+                <a:defRPr sz="1800" kern="1200">
+                  <a:solidFill>
+                    <a:schemeClr val="tx1"/>
+                  </a:solidFill>
+                  <a:latin typeface="+mn-lt"/>
+                  <a:ea typeface="+mn-ea"/>
+                  <a:cs typeface="+mn-cs"/>
+                </a:defRPr>
+              </a:lvl8pPr>
+              <a:lvl9pPr marL="3730969" algn="l" defTabSz="932742" rtl="0" eaLnBrk="1" latinLnBrk="0" hangingPunct="1">
+                <a:defRPr sz="1800" kern="1200">
+                  <a:solidFill>
+                    <a:schemeClr val="tx1"/>
+                  </a:solidFill>
+                  <a:latin typeface="+mn-lt"/>
+                  <a:ea typeface="+mn-ea"/>
+                  <a:cs typeface="+mn-cs"/>
+                </a:defRPr>
+              </a:lvl9pPr>
+            </a:lstStyle>
+            <a:p>
+              <a:pPr marL="0" marR="0" lvl="0" indent="0" algn="l" defTabSz="932742" rtl="0" eaLnBrk="1" fontAlgn="auto" latinLnBrk="0" hangingPunct="1">
+                <a:lnSpc>
+                  <a:spcPct val="90000"/>
+                </a:lnSpc>
+                <a:spcBef>
+                  <a:spcPts val="0"/>
+                </a:spcBef>
+                <a:spcAft>
+                  <a:spcPts val="600"/>
+                </a:spcAft>
+                <a:buClrTx/>
+                <a:buSzTx/>
+                <a:buFontTx/>
+                <a:buNone/>
+                <a:tabLst/>
+                <a:defRPr/>
+              </a:pPr>
+              <a:r>
+                <a:rPr kumimoji="0" lang="en-US" sz="2400" b="1" i="0" u="none" strike="noStrike" kern="1200" cap="none" spc="0" normalizeH="0" baseline="0" noProof="0" dirty="0">
+                  <a:ln>
+                    <a:noFill/>
+                  </a:ln>
+                  <a:effectLst/>
+                  <a:uLnTx/>
+                  <a:uFillTx/>
+                  <a:latin typeface="Segoe UI"/>
+                  <a:ea typeface="+mn-ea"/>
+                  <a:cs typeface="+mn-cs"/>
+                </a:rPr>
+                <a:t>IDE</a:t>
+              </a:r>
+            </a:p>
+          </p:txBody>
+        </p:sp>
+        <p:sp>
+          <p:nvSpPr>
+            <p:cNvPr id="14" name="TextBox 7"/>
+            <p:cNvSpPr txBox="1"/>
+            <p:nvPr/>
+          </p:nvSpPr>
+          <p:spPr>
+            <a:xfrm>
+              <a:off x="646137" y="2886076"/>
+              <a:ext cx="1860830" cy="627864"/>
+            </a:xfrm>
+            <a:prstGeom prst="rect">
+              <a:avLst/>
+            </a:prstGeom>
+            <a:noFill/>
+          </p:spPr>
+          <p:txBody>
+            <a:bodyPr wrap="none" lIns="182880" tIns="146304" rIns="182880" bIns="146304" rtlCol="0">
+              <a:spAutoFit/>
+            </a:bodyPr>
+            <a:lstStyle>
+              <a:defPPr>
+                <a:defRPr lang="en-US"/>
+              </a:defPPr>
+              <a:lvl1pPr marL="0" algn="l" defTabSz="932742" rtl="0" eaLnBrk="1" latinLnBrk="0" hangingPunct="1">
+                <a:defRPr sz="1800" kern="1200">
+                  <a:solidFill>
+                    <a:schemeClr val="tx1"/>
+                  </a:solidFill>
+                  <a:latin typeface="+mn-lt"/>
+                  <a:ea typeface="+mn-ea"/>
+                  <a:cs typeface="+mn-cs"/>
+                </a:defRPr>
+              </a:lvl1pPr>
+              <a:lvl2pPr marL="466371" algn="l" defTabSz="932742" rtl="0" eaLnBrk="1" latinLnBrk="0" hangingPunct="1">
+                <a:defRPr sz="1800" kern="1200">
+                  <a:solidFill>
+                    <a:schemeClr val="tx1"/>
+                  </a:solidFill>
+                  <a:latin typeface="+mn-lt"/>
+                  <a:ea typeface="+mn-ea"/>
+                  <a:cs typeface="+mn-cs"/>
+                </a:defRPr>
+              </a:lvl2pPr>
+              <a:lvl3pPr marL="932742" algn="l" defTabSz="932742" rtl="0" eaLnBrk="1" latinLnBrk="0" hangingPunct="1">
+                <a:defRPr sz="1800" kern="1200">
+                  <a:solidFill>
+                    <a:schemeClr val="tx1"/>
+                  </a:solidFill>
+                  <a:latin typeface="+mn-lt"/>
+                  <a:ea typeface="+mn-ea"/>
+                  <a:cs typeface="+mn-cs"/>
+                </a:defRPr>
+              </a:lvl3pPr>
+              <a:lvl4pPr marL="1399113" algn="l" defTabSz="932742" rtl="0" eaLnBrk="1" latinLnBrk="0" hangingPunct="1">
+                <a:defRPr sz="1800" kern="1200">
+                  <a:solidFill>
+                    <a:schemeClr val="tx1"/>
+                  </a:solidFill>
+                  <a:latin typeface="+mn-lt"/>
+                  <a:ea typeface="+mn-ea"/>
+                  <a:cs typeface="+mn-cs"/>
+                </a:defRPr>
+              </a:lvl4pPr>
+              <a:lvl5pPr marL="1865484" algn="l" defTabSz="932742" rtl="0" eaLnBrk="1" latinLnBrk="0" hangingPunct="1">
+                <a:defRPr sz="1800" kern="1200">
+                  <a:solidFill>
+                    <a:schemeClr val="tx1"/>
+                  </a:solidFill>
+                  <a:latin typeface="+mn-lt"/>
+                  <a:ea typeface="+mn-ea"/>
+                  <a:cs typeface="+mn-cs"/>
+                </a:defRPr>
+              </a:lvl5pPr>
+              <a:lvl6pPr marL="2331856" algn="l" defTabSz="932742" rtl="0" eaLnBrk="1" latinLnBrk="0" hangingPunct="1">
+                <a:defRPr sz="1800" kern="1200">
+                  <a:solidFill>
+                    <a:schemeClr val="tx1"/>
+                  </a:solidFill>
+                  <a:latin typeface="+mn-lt"/>
+                  <a:ea typeface="+mn-ea"/>
+                  <a:cs typeface="+mn-cs"/>
+                </a:defRPr>
+              </a:lvl6pPr>
+              <a:lvl7pPr marL="2798226" algn="l" defTabSz="932742" rtl="0" eaLnBrk="1" latinLnBrk="0" hangingPunct="1">
+                <a:defRPr sz="1800" kern="1200">
+                  <a:solidFill>
+                    <a:schemeClr val="tx1"/>
+                  </a:solidFill>
+                  <a:latin typeface="+mn-lt"/>
+                  <a:ea typeface="+mn-ea"/>
+                  <a:cs typeface="+mn-cs"/>
+                </a:defRPr>
+              </a:lvl7pPr>
+              <a:lvl8pPr marL="3264597" algn="l" defTabSz="932742" rtl="0" eaLnBrk="1" latinLnBrk="0" hangingPunct="1">
+                <a:defRPr sz="1800" kern="1200">
+                  <a:solidFill>
+                    <a:schemeClr val="tx1"/>
+                  </a:solidFill>
+                  <a:latin typeface="+mn-lt"/>
+                  <a:ea typeface="+mn-ea"/>
+                  <a:cs typeface="+mn-cs"/>
+                </a:defRPr>
+              </a:lvl8pPr>
+              <a:lvl9pPr marL="3730969" algn="l" defTabSz="932742" rtl="0" eaLnBrk="1" latinLnBrk="0" hangingPunct="1">
+                <a:defRPr sz="1800" kern="1200">
+                  <a:solidFill>
+                    <a:schemeClr val="tx1"/>
+                  </a:solidFill>
+                  <a:latin typeface="+mn-lt"/>
+                  <a:ea typeface="+mn-ea"/>
+                  <a:cs typeface="+mn-cs"/>
+                </a:defRPr>
+              </a:lvl9pPr>
+            </a:lstStyle>
+            <a:p>
+              <a:pPr marL="0" marR="0" lvl="0" indent="0" algn="l" defTabSz="932742" rtl="0" eaLnBrk="1" fontAlgn="auto" latinLnBrk="0" hangingPunct="1">
+                <a:lnSpc>
+                  <a:spcPct val="90000"/>
+                </a:lnSpc>
+                <a:spcBef>
+                  <a:spcPts val="0"/>
+                </a:spcBef>
+                <a:spcAft>
+                  <a:spcPts val="600"/>
+                </a:spcAft>
+                <a:buClrTx/>
+                <a:buSzTx/>
+                <a:buFontTx/>
+                <a:buNone/>
+                <a:tabLst/>
+                <a:defRPr/>
+              </a:pPr>
+              <a:r>
+                <a:rPr kumimoji="0" lang="en-US" sz="2400" b="0" i="0" u="none" strike="noStrike" kern="1200" cap="none" spc="0" normalizeH="0" baseline="0" noProof="0" dirty="0">
+                  <a:ln>
+                    <a:noFill/>
+                  </a:ln>
+                  <a:gradFill>
+                    <a:gsLst>
+                      <a:gs pos="2917">
+                        <a:srgbClr val="FFFFFF"/>
+                      </a:gs>
+                      <a:gs pos="30000">
+                        <a:srgbClr val="FFFFFF"/>
+                      </a:gs>
+                    </a:gsLst>
+                    <a:lin ang="5400000" scaled="0"/>
+                  </a:gradFill>
+                  <a:effectLst/>
+                  <a:uLnTx/>
+                  <a:uFillTx/>
+                  <a:latin typeface="Segoe UI"/>
+                  <a:ea typeface="+mn-ea"/>
+                  <a:cs typeface="+mn-cs"/>
+                </a:rPr>
+                <a:t>Text </a:t>
+              </a:r>
+              <a:r>
+                <a:rPr kumimoji="0" lang="en-US" sz="2400" b="1" i="0" u="none" strike="noStrike" kern="1200" cap="none" spc="0" normalizeH="0" baseline="0" noProof="0" dirty="0">
+                  <a:ln>
+                    <a:noFill/>
+                  </a:ln>
+                  <a:effectLst/>
+                  <a:uLnTx/>
+                  <a:uFillTx/>
+                  <a:latin typeface="Segoe UI"/>
+                  <a:ea typeface="+mn-ea"/>
+                  <a:cs typeface="+mn-cs"/>
+                </a:rPr>
+                <a:t>Editor</a:t>
+              </a:r>
+            </a:p>
+          </p:txBody>
+        </p:sp>
+      </p:grpSp>
+      <p:grpSp>
+        <p:nvGrpSpPr>
+          <p:cNvPr id="9" name="Group 8"/>
+          <p:cNvGrpSpPr/>
+          <p:nvPr/>
+        </p:nvGrpSpPr>
+        <p:grpSpPr>
+          <a:xfrm>
+            <a:off x="2380309" y="1814447"/>
+            <a:ext cx="1085260" cy="1630778"/>
+            <a:chOff x="3398837" y="2811463"/>
+            <a:chExt cx="1219200" cy="2478084"/>
+          </a:xfrm>
+        </p:grpSpPr>
+        <p:cxnSp>
+          <p:nvCxnSpPr>
+            <p:cNvPr id="10" name="Straight Arrow Connector 9"/>
+            <p:cNvCxnSpPr/>
+            <p:nvPr/>
+          </p:nvCxnSpPr>
+          <p:spPr>
+            <a:xfrm flipV="1">
+              <a:off x="4618037" y="2811463"/>
+              <a:ext cx="0" cy="1523999"/>
+            </a:xfrm>
+            <a:prstGeom prst="straightConnector1">
+              <a:avLst/>
+            </a:prstGeom>
+            <a:ln w="63500">
+              <a:solidFill>
+                <a:schemeClr val="tx1"/>
+              </a:solidFill>
+              <a:headEnd type="none"/>
+              <a:tailEnd type="triangle"/>
+            </a:ln>
+          </p:spPr>
+          <p:style>
+            <a:lnRef idx="1">
+              <a:schemeClr val="accent1"/>
+            </a:lnRef>
+            <a:fillRef idx="0">
+              <a:schemeClr val="accent1"/>
+            </a:fillRef>
+            <a:effectRef idx="0">
+              <a:schemeClr val="accent1"/>
+            </a:effectRef>
+            <a:fontRef idx="minor">
+              <a:schemeClr val="tx1"/>
+            </a:fontRef>
+          </p:style>
+        </p:cxnSp>
+        <p:sp>
+          <p:nvSpPr>
+            <p:cNvPr id="11" name="TextBox 11"/>
+            <p:cNvSpPr txBox="1"/>
+            <p:nvPr/>
+          </p:nvSpPr>
+          <p:spPr>
+            <a:xfrm>
+              <a:off x="3398837" y="4335463"/>
+              <a:ext cx="414987" cy="954084"/>
+            </a:xfrm>
+            <a:prstGeom prst="rect">
+              <a:avLst/>
+            </a:prstGeom>
+            <a:noFill/>
+          </p:spPr>
+          <p:txBody>
+            <a:bodyPr wrap="none" lIns="182880" tIns="146304" rIns="182880" bIns="146304" rtlCol="0">
+              <a:spAutoFit/>
+            </a:bodyPr>
+            <a:lstStyle>
+              <a:defPPr>
+                <a:defRPr lang="en-US"/>
+              </a:defPPr>
+              <a:lvl1pPr marL="0" algn="l" defTabSz="932742" rtl="0" eaLnBrk="1" latinLnBrk="0" hangingPunct="1">
+                <a:defRPr sz="1800" kern="1200">
+                  <a:solidFill>
+                    <a:schemeClr val="tx1"/>
+                  </a:solidFill>
+                  <a:latin typeface="+mn-lt"/>
+                  <a:ea typeface="+mn-ea"/>
+                  <a:cs typeface="+mn-cs"/>
+                </a:defRPr>
+              </a:lvl1pPr>
+              <a:lvl2pPr marL="466371" algn="l" defTabSz="932742" rtl="0" eaLnBrk="1" latinLnBrk="0" hangingPunct="1">
+                <a:defRPr sz="1800" kern="1200">
+                  <a:solidFill>
+                    <a:schemeClr val="tx1"/>
+                  </a:solidFill>
+                  <a:latin typeface="+mn-lt"/>
+                  <a:ea typeface="+mn-ea"/>
+                  <a:cs typeface="+mn-cs"/>
+                </a:defRPr>
+              </a:lvl2pPr>
+              <a:lvl3pPr marL="932742" algn="l" defTabSz="932742" rtl="0" eaLnBrk="1" latinLnBrk="0" hangingPunct="1">
+                <a:defRPr sz="1800" kern="1200">
+                  <a:solidFill>
+                    <a:schemeClr val="tx1"/>
+                  </a:solidFill>
+                  <a:latin typeface="+mn-lt"/>
+                  <a:ea typeface="+mn-ea"/>
+                  <a:cs typeface="+mn-cs"/>
+                </a:defRPr>
+              </a:lvl3pPr>
+              <a:lvl4pPr marL="1399113" algn="l" defTabSz="932742" rtl="0" eaLnBrk="1" latinLnBrk="0" hangingPunct="1">
+                <a:defRPr sz="1800" kern="1200">
+                  <a:solidFill>
+                    <a:schemeClr val="tx1"/>
+                  </a:solidFill>
+                  <a:latin typeface="+mn-lt"/>
+                  <a:ea typeface="+mn-ea"/>
+                  <a:cs typeface="+mn-cs"/>
+                </a:defRPr>
+              </a:lvl4pPr>
+              <a:lvl5pPr marL="1865484" algn="l" defTabSz="932742" rtl="0" eaLnBrk="1" latinLnBrk="0" hangingPunct="1">
+                <a:defRPr sz="1800" kern="1200">
+                  <a:solidFill>
+                    <a:schemeClr val="tx1"/>
+                  </a:solidFill>
+                  <a:latin typeface="+mn-lt"/>
+                  <a:ea typeface="+mn-ea"/>
+                  <a:cs typeface="+mn-cs"/>
+                </a:defRPr>
+              </a:lvl5pPr>
+              <a:lvl6pPr marL="2331856" algn="l" defTabSz="932742" rtl="0" eaLnBrk="1" latinLnBrk="0" hangingPunct="1">
+                <a:defRPr sz="1800" kern="1200">
+                  <a:solidFill>
+                    <a:schemeClr val="tx1"/>
+                  </a:solidFill>
+                  <a:latin typeface="+mn-lt"/>
+                  <a:ea typeface="+mn-ea"/>
+                  <a:cs typeface="+mn-cs"/>
+                </a:defRPr>
+              </a:lvl6pPr>
+              <a:lvl7pPr marL="2798226" algn="l" defTabSz="932742" rtl="0" eaLnBrk="1" latinLnBrk="0" hangingPunct="1">
+                <a:defRPr sz="1800" kern="1200">
+                  <a:solidFill>
+                    <a:schemeClr val="tx1"/>
+                  </a:solidFill>
+                  <a:latin typeface="+mn-lt"/>
+                  <a:ea typeface="+mn-ea"/>
+                  <a:cs typeface="+mn-cs"/>
+                </a:defRPr>
+              </a:lvl7pPr>
+              <a:lvl8pPr marL="3264597" algn="l" defTabSz="932742" rtl="0" eaLnBrk="1" latinLnBrk="0" hangingPunct="1">
+                <a:defRPr sz="1800" kern="1200">
+                  <a:solidFill>
+                    <a:schemeClr val="tx1"/>
+                  </a:solidFill>
+                  <a:latin typeface="+mn-lt"/>
+                  <a:ea typeface="+mn-ea"/>
+                  <a:cs typeface="+mn-cs"/>
+                </a:defRPr>
+              </a:lvl8pPr>
+              <a:lvl9pPr marL="3730969" algn="l" defTabSz="932742" rtl="0" eaLnBrk="1" latinLnBrk="0" hangingPunct="1">
+                <a:defRPr sz="1800" kern="1200">
+                  <a:solidFill>
+                    <a:schemeClr val="tx1"/>
+                  </a:solidFill>
+                  <a:latin typeface="+mn-lt"/>
+                  <a:ea typeface="+mn-ea"/>
+                  <a:cs typeface="+mn-cs"/>
+                </a:defRPr>
+              </a:lvl9pPr>
+            </a:lstStyle>
+            <a:p>
+              <a:pPr marL="0" marR="0" lvl="0" indent="0" algn="l" defTabSz="932742" rtl="0" eaLnBrk="1" fontAlgn="auto" latinLnBrk="0" hangingPunct="1">
+                <a:lnSpc>
+                  <a:spcPct val="90000"/>
+                </a:lnSpc>
+                <a:spcBef>
+                  <a:spcPts val="0"/>
+                </a:spcBef>
+                <a:spcAft>
+                  <a:spcPts val="600"/>
+                </a:spcAft>
+                <a:buClrTx/>
+                <a:buSzTx/>
+                <a:buFontTx/>
+                <a:buNone/>
+                <a:tabLst/>
+                <a:defRPr/>
+              </a:pPr>
+              <a:endParaRPr kumimoji="0" lang="en-US" sz="2400" b="0" i="0" u="none" strike="noStrike" kern="1200" cap="none" spc="0" normalizeH="0" baseline="0" noProof="0" dirty="0">
+                <a:ln>
+                  <a:noFill/>
+                </a:ln>
+                <a:effectLst/>
+                <a:uLnTx/>
+                <a:uFillTx/>
+                <a:latin typeface="Segoe UI"/>
+                <a:ea typeface="+mn-ea"/>
+                <a:cs typeface="+mn-cs"/>
+              </a:endParaRPr>
+            </a:p>
+          </p:txBody>
+        </p:sp>
+      </p:grpSp>
     </p:spTree>
     <p:extLst>
       <p:ext uri="{BB962C8B-B14F-4D97-AF65-F5344CB8AC3E}">
@@ -11194,210 +11856,6 @@
 </file>
 
 <file path=ppt/slides/slide30.xml><?xml version="1.0" encoding="utf-8"?>
-<p:sld xmlns:a="http://schemas.openxmlformats.org/drawingml/2006/main" xmlns:r="http://schemas.openxmlformats.org/officeDocument/2006/relationships" xmlns:p="http://schemas.openxmlformats.org/presentationml/2006/main">
-  <p:cSld>
-    <p:spTree>
-      <p:nvGrpSpPr>
-        <p:cNvPr id="1" name=""/>
-        <p:cNvGrpSpPr/>
-        <p:nvPr/>
-      </p:nvGrpSpPr>
-      <p:grpSpPr>
-        <a:xfrm>
-          <a:off x="0" y="0"/>
-          <a:ext cx="0" cy="0"/>
-          <a:chOff x="0" y="0"/>
-          <a:chExt cx="0" cy="0"/>
-        </a:xfrm>
-      </p:grpSpPr>
-      <p:sp>
-        <p:nvSpPr>
-          <p:cNvPr id="2" name="Title 1"/>
-          <p:cNvSpPr>
-            <a:spLocks noGrp="1"/>
-          </p:cNvSpPr>
-          <p:nvPr>
-            <p:ph type="title"/>
-          </p:nvPr>
-        </p:nvSpPr>
-        <p:spPr/>
-        <p:txBody>
-          <a:bodyPr/>
-          <a:lstStyle/>
-          <a:p>
-            <a:r>
-              <a:rPr lang="en-US" dirty="0"/>
-              <a:t>Resources</a:t>
-            </a:r>
-          </a:p>
-        </p:txBody>
-      </p:sp>
-      <p:sp>
-        <p:nvSpPr>
-          <p:cNvPr id="3" name="Content Placeholder 2"/>
-          <p:cNvSpPr>
-            <a:spLocks noGrp="1"/>
-          </p:cNvSpPr>
-          <p:nvPr>
-            <p:ph idx="1"/>
-          </p:nvPr>
-        </p:nvSpPr>
-        <p:spPr/>
-        <p:txBody>
-          <a:bodyPr>
-            <a:normAutofit fontScale="92500" lnSpcReduction="10000"/>
-          </a:bodyPr>
-          <a:lstStyle/>
-          <a:p>
-            <a:r>
-              <a:rPr lang="en-US" dirty="0">
-                <a:hlinkClick r:id="rId2"/>
-              </a:rPr>
-              <a:t>Best of VS Code: Tips and Tricks</a:t>
-            </a:r>
-            <a:endParaRPr lang="en-US" dirty="0">
-              <a:hlinkClick r:id="rId3"/>
-            </a:endParaRPr>
-          </a:p>
-          <a:p>
-            <a:pPr lvl="1"/>
-            <a:r>
-              <a:rPr lang="en-US" dirty="0"/>
-              <a:t>Build 2016 session</a:t>
-            </a:r>
-          </a:p>
-          <a:p>
-            <a:endParaRPr lang="en-US" dirty="0">
-              <a:hlinkClick r:id="rId3"/>
-            </a:endParaRPr>
-          </a:p>
-          <a:p>
-            <a:r>
-              <a:rPr lang="en-US" dirty="0">
-                <a:hlinkClick r:id="rId4"/>
-              </a:rPr>
-              <a:t>VS Code Docs</a:t>
-            </a:r>
-            <a:endParaRPr lang="en-US" dirty="0"/>
-          </a:p>
-          <a:p>
-            <a:endParaRPr lang="en-US" dirty="0">
-              <a:hlinkClick r:id="rId3"/>
-            </a:endParaRPr>
-          </a:p>
-          <a:p>
-            <a:r>
-              <a:rPr lang="en-US" dirty="0">
-                <a:hlinkClick r:id="rId5"/>
-              </a:rPr>
-              <a:t>VS Code Source on GitHub</a:t>
-            </a:r>
-            <a:endParaRPr lang="en-US" dirty="0">
-              <a:hlinkClick r:id="rId3"/>
-            </a:endParaRPr>
-          </a:p>
-          <a:p>
-            <a:pPr marL="0" indent="0">
-              <a:buNone/>
-            </a:pPr>
-            <a:endParaRPr lang="en-US" dirty="0">
-              <a:hlinkClick r:id="rId3"/>
-            </a:endParaRPr>
-          </a:p>
-          <a:p>
-            <a:r>
-              <a:rPr lang="en-US" dirty="0">
-                <a:hlinkClick r:id="rId6"/>
-              </a:rPr>
-              <a:t>Visual Studio Code</a:t>
-            </a:r>
-            <a:endParaRPr lang="en-US" dirty="0"/>
-          </a:p>
-          <a:p>
-            <a:pPr lvl="1"/>
-            <a:r>
-              <a:rPr lang="en-US" dirty="0"/>
-              <a:t>John Papa, </a:t>
-            </a:r>
-            <a:r>
-              <a:rPr lang="en-US" dirty="0" err="1"/>
-              <a:t>Pluralsight</a:t>
-            </a:r>
-            <a:r>
-              <a:rPr lang="en-US" dirty="0"/>
-              <a:t> course</a:t>
-            </a:r>
-          </a:p>
-          <a:p>
-            <a:pPr lvl="1"/>
-            <a:endParaRPr lang="en-US" dirty="0"/>
-          </a:p>
-          <a:p>
-            <a:r>
-              <a:rPr lang="en-US" dirty="0">
-                <a:hlinkClick r:id="rId7"/>
-              </a:rPr>
-              <a:t>VS Code ES6 Sample Project</a:t>
-            </a:r>
-            <a:endParaRPr lang="en-US" dirty="0"/>
-          </a:p>
-          <a:p>
-            <a:pPr marL="0" indent="0">
-              <a:buNone/>
-            </a:pPr>
-            <a:endParaRPr lang="en-US" dirty="0"/>
-          </a:p>
-        </p:txBody>
-      </p:sp>
-      <p:sp>
-        <p:nvSpPr>
-          <p:cNvPr id="4" name="Slide Number Placeholder 3"/>
-          <p:cNvSpPr>
-            <a:spLocks noGrp="1"/>
-          </p:cNvSpPr>
-          <p:nvPr>
-            <p:ph type="sldNum" sz="quarter" idx="12"/>
-          </p:nvPr>
-        </p:nvSpPr>
-        <p:spPr/>
-        <p:txBody>
-          <a:bodyPr/>
-          <a:lstStyle/>
-          <a:p>
-            <a:fld id="{CA6404EB-EC22-4A9F-B979-51DB938C35B6}" type="slidenum">
-              <a:rPr lang="en-US" smtClean="0"/>
-              <a:t>30</a:t>
-            </a:fld>
-            <a:endParaRPr lang="en-US" dirty="0"/>
-          </a:p>
-        </p:txBody>
-      </p:sp>
-    </p:spTree>
-    <p:extLst>
-      <p:ext uri="{BB962C8B-B14F-4D97-AF65-F5344CB8AC3E}">
-        <p14:creationId xmlns:p14="http://schemas.microsoft.com/office/powerpoint/2010/main" val="3638863624"/>
-      </p:ext>
-    </p:extLst>
-  </p:cSld>
-  <p:clrMapOvr>
-    <a:masterClrMapping/>
-  </p:clrMapOvr>
-  <mc:AlternateContent xmlns:mc="http://schemas.openxmlformats.org/markup-compatibility/2006" xmlns:p14="http://schemas.microsoft.com/office/powerpoint/2010/main">
-    <mc:Choice Requires="p14">
-      <p:transition p14:dur="250">
-        <p:fade/>
-      </p:transition>
-    </mc:Choice>
-    <mc:Fallback xmlns="">
-      <p:transition>
-        <p:fade/>
-      </p:transition>
-    </mc:Fallback>
-  </mc:AlternateContent>
-</p:sld>
-</file>
-
-<file path=ppt/slides/slide31.xml><?xml version="1.0" encoding="utf-8"?>
 <p:sld xmlns:a="http://schemas.openxmlformats.org/drawingml/2006/main" xmlns:r="http://schemas.openxmlformats.org/officeDocument/2006/relationships" xmlns:p="http://schemas.openxmlformats.org/presentationml/2006/main">
   <p:cSld>
     <p:spTree>
@@ -11530,7 +11988,7 @@
           <a:p>
             <a:fld id="{CA6404EB-EC22-4A9F-B979-51DB938C35B6}" type="slidenum">
               <a:rPr lang="en-US" smtClean="0"/>
-              <a:t>31</a:t>
+              <a:t>30</a:t>
             </a:fld>
             <a:endParaRPr lang="en-US" dirty="0"/>
           </a:p>
@@ -12248,6 +12706,13 @@
           <a:prstGeom prst="rect">
             <a:avLst/>
           </a:prstGeom>
+          <a:effectLst>
+            <a:outerShdw blurRad="63500" sx="102000" sy="102000" algn="ctr" rotWithShape="0">
+              <a:prstClr val="black">
+                <a:alpha val="40000"/>
+              </a:prstClr>
+            </a:outerShdw>
+          </a:effectLst>
         </p:spPr>
       </p:pic>
       <p:sp>

</xml_diff>

<commit_message>
Add drop shadow to VS Code screenshot
</commit_message>
<xml_diff>
--- a/Intro to JavaScript Tooling in VS Code - devObjective.pptx
+++ b/Intro to JavaScript Tooling in VS Code - devObjective.pptx
@@ -8886,6 +8886,13 @@
           <a:prstGeom prst="rect">
             <a:avLst/>
           </a:prstGeom>
+          <a:effectLst>
+            <a:outerShdw blurRad="63500" sx="102000" sy="102000" algn="ctr" rotWithShape="0">
+              <a:prstClr val="black">
+                <a:alpha val="40000"/>
+              </a:prstClr>
+            </a:outerShdw>
+          </a:effectLst>
         </p:spPr>
       </p:pic>
       <p:sp>
@@ -15163,8 +15170,8 @@
           </a:p>
         </p:txBody>
       </p:sp>
-      <mc:AlternateContent xmlns:mc="http://schemas.openxmlformats.org/markup-compatibility/2006" xmlns:we="http://schemas.microsoft.com/office/webextensions/webextension/2010/11" xmlns:pca="http://schemas.microsoft.com/office/powerpoint/2013/contentapp">
-        <mc:Choice Requires="we pca">
+      <mc:AlternateContent xmlns:mc="http://schemas.openxmlformats.org/markup-compatibility/2006">
+        <mc:Choice xmlns:we="http://schemas.microsoft.com/office/webextensions/webextension/2010/11" xmlns:pca="http://schemas.microsoft.com/office/powerpoint/2013/contentapp" Requires="we pca">
           <p:graphicFrame>
             <p:nvGraphicFramePr>
               <p:cNvPr id="5" name="Content Placeholder 4" title="Code Presenter Pro"/>
@@ -15191,7 +15198,7 @@
             </a:graphic>
           </p:graphicFrame>
         </mc:Choice>
-        <mc:Fallback xmlns="">
+        <mc:Fallback>
           <p:pic>
             <p:nvPicPr>
               <p:cNvPr id="5" name="Content Placeholder 4" title="Code Presenter Pro"/>

</xml_diff>

<commit_message>
Bump version number on About VS Code slide
</commit_message>
<xml_diff>
--- a/Intro to JavaScript Tooling in VS Code - devObjective.pptx
+++ b/Intro to JavaScript Tooling in VS Code - devObjective.pptx
@@ -251,7 +251,7 @@
           <a:p>
             <a:fld id="{669E24BE-8A14-406C-93AE-FEDF4702362B}" type="datetimeFigureOut">
               <a:rPr lang="en-US" smtClean="0"/>
-              <a:t>6/13/2016</a:t>
+              <a:t>6/14/2016</a:t>
             </a:fld>
             <a:endParaRPr lang="en-US" dirty="0"/>
           </a:p>
@@ -1509,7 +1509,7 @@
           <a:p>
             <a:fld id="{8008D7A7-D1E9-49FE-B288-75D755D02F1B}" type="datetime1">
               <a:rPr lang="en-US" smtClean="0"/>
-              <a:t>6/13/2016</a:t>
+              <a:t>6/14/2016</a:t>
             </a:fld>
             <a:endParaRPr lang="en-US" dirty="0"/>
           </a:p>
@@ -1772,7 +1772,7 @@
           <a:p>
             <a:fld id="{565130A9-CCEE-4E49-AF50-9A9178C093F5}" type="datetime1">
               <a:rPr lang="en-US" smtClean="0"/>
-              <a:t>6/13/2016</a:t>
+              <a:t>6/14/2016</a:t>
             </a:fld>
             <a:endParaRPr lang="en-US" dirty="0"/>
           </a:p>
@@ -2098,7 +2098,7 @@
           <a:p>
             <a:fld id="{5FFEE7F5-B2E5-489A-976D-734D7F853DE3}" type="datetime1">
               <a:rPr lang="en-US" smtClean="0"/>
-              <a:t>6/13/2016</a:t>
+              <a:t>6/14/2016</a:t>
             </a:fld>
             <a:endParaRPr lang="en-US" dirty="0"/>
           </a:p>
@@ -2451,7 +2451,7 @@
           <a:p>
             <a:fld id="{1DDC5727-5F18-4B62-81B5-C092F8CCA971}" type="datetime1">
               <a:rPr lang="en-US" smtClean="0"/>
-              <a:t>6/13/2016</a:t>
+              <a:t>6/14/2016</a:t>
             </a:fld>
             <a:endParaRPr lang="en-US" dirty="0"/>
           </a:p>
@@ -2777,7 +2777,7 @@
           <a:p>
             <a:fld id="{DD7596D5-BBCA-4EE5-AC34-2F838BA68892}" type="datetime1">
               <a:rPr lang="en-US" smtClean="0"/>
-              <a:t>6/13/2016</a:t>
+              <a:t>6/14/2016</a:t>
             </a:fld>
             <a:endParaRPr lang="en-US" dirty="0"/>
           </a:p>
@@ -3182,7 +3182,7 @@
           <a:p>
             <a:fld id="{C87E594A-105F-4330-BE78-40BFD5E05FF3}" type="datetime1">
               <a:rPr lang="en-US" smtClean="0"/>
-              <a:t>6/13/2016</a:t>
+              <a:t>6/14/2016</a:t>
             </a:fld>
             <a:endParaRPr lang="en-US" dirty="0"/>
           </a:p>
@@ -3364,7 +3364,7 @@
           <a:p>
             <a:fld id="{50DAB467-0635-440B-9BC4-DA322DD73B70}" type="datetime1">
               <a:rPr lang="en-US" smtClean="0"/>
-              <a:t>6/13/2016</a:t>
+              <a:t>6/14/2016</a:t>
             </a:fld>
             <a:endParaRPr lang="en-US" dirty="0"/>
           </a:p>
@@ -3556,7 +3556,7 @@
           <a:p>
             <a:fld id="{5E48D92D-E3A5-4B10-B1FC-D041F161170C}" type="datetime1">
               <a:rPr lang="en-US" smtClean="0"/>
-              <a:t>6/13/2016</a:t>
+              <a:t>6/14/2016</a:t>
             </a:fld>
             <a:endParaRPr lang="en-US" dirty="0"/>
           </a:p>
@@ -3744,7 +3744,7 @@
           <a:p>
             <a:fld id="{834C18EA-D952-4AE1-A6E7-E6731635F9D2}" type="datetime1">
               <a:rPr lang="en-US" smtClean="0"/>
-              <a:t>6/13/2016</a:t>
+              <a:t>6/14/2016</a:t>
             </a:fld>
             <a:endParaRPr lang="en-US" dirty="0"/>
           </a:p>
@@ -4003,7 +4003,7 @@
           <a:p>
             <a:fld id="{13032A52-9E14-487A-A3FB-E00D36231CE7}" type="datetime1">
               <a:rPr lang="en-US" smtClean="0"/>
-              <a:t>6/13/2016</a:t>
+              <a:t>6/14/2016</a:t>
             </a:fld>
             <a:endParaRPr lang="en-US" dirty="0"/>
           </a:p>
@@ -4247,7 +4247,7 @@
           <a:p>
             <a:fld id="{8C5CA72F-91C6-447B-8CFD-10CC50FBFEAC}" type="datetime1">
               <a:rPr lang="en-US" smtClean="0"/>
-              <a:t>6/13/2016</a:t>
+              <a:t>6/14/2016</a:t>
             </a:fld>
             <a:endParaRPr lang="en-US" dirty="0"/>
           </a:p>
@@ -4633,7 +4633,7 @@
           <a:p>
             <a:fld id="{2CCBA931-94B6-4C88-A7AC-0B43FAFFEEC1}" type="datetime1">
               <a:rPr lang="en-US" smtClean="0"/>
-              <a:t>6/13/2016</a:t>
+              <a:t>6/14/2016</a:t>
             </a:fld>
             <a:endParaRPr lang="en-US" dirty="0"/>
           </a:p>
@@ -4768,7 +4768,7 @@
           <a:p>
             <a:fld id="{A17CC6B2-4719-4EFD-BB2D-A2C62F0625B7}" type="datetime1">
               <a:rPr lang="en-US" smtClean="0"/>
-              <a:t>6/13/2016</a:t>
+              <a:t>6/14/2016</a:t>
             </a:fld>
             <a:endParaRPr lang="en-US" dirty="0"/>
           </a:p>
@@ -4875,7 +4875,7 @@
           <a:p>
             <a:fld id="{9AC4E54B-2176-4BC1-BC54-F80551EDB034}" type="datetime1">
               <a:rPr lang="en-US" smtClean="0"/>
-              <a:t>6/13/2016</a:t>
+              <a:t>6/14/2016</a:t>
             </a:fld>
             <a:endParaRPr lang="en-US" dirty="0"/>
           </a:p>
@@ -5142,7 +5142,7 @@
           <a:p>
             <a:fld id="{F73BBE7C-717C-4AB2-A881-24835FA94B24}" type="datetime1">
               <a:rPr lang="en-US" smtClean="0"/>
-              <a:t>6/13/2016</a:t>
+              <a:t>6/14/2016</a:t>
             </a:fld>
             <a:endParaRPr lang="en-US" dirty="0"/>
           </a:p>
@@ -5416,7 +5416,7 @@
           <a:p>
             <a:fld id="{BD6C4C3D-17A3-49F5-8381-0500C8735BF2}" type="datetime1">
               <a:rPr lang="en-US" smtClean="0"/>
-              <a:t>6/13/2016</a:t>
+              <a:t>6/14/2016</a:t>
             </a:fld>
             <a:endParaRPr lang="en-US" dirty="0"/>
           </a:p>
@@ -6171,7 +6171,7 @@
           <a:p>
             <a:fld id="{1D480221-EA8F-4F92-87B7-59E96BBC3974}" type="datetime1">
               <a:rPr lang="en-US" smtClean="0"/>
-              <a:t>6/13/2016</a:t>
+              <a:t>6/14/2016</a:t>
             </a:fld>
             <a:endParaRPr lang="en-US" dirty="0"/>
           </a:p>
@@ -7169,8 +7169,8 @@
           </a:p>
         </p:txBody>
       </p:sp>
-      <mc:AlternateContent xmlns:mc="http://schemas.openxmlformats.org/markup-compatibility/2006">
-        <mc:Choice xmlns:we="http://schemas.microsoft.com/office/webextensions/webextension/2010/11" xmlns:pca="http://schemas.microsoft.com/office/powerpoint/2013/contentapp" Requires="we pca">
+      <mc:AlternateContent xmlns:mc="http://schemas.openxmlformats.org/markup-compatibility/2006" xmlns:we="http://schemas.microsoft.com/office/webextensions/webextension/2010/11" xmlns:pca="http://schemas.microsoft.com/office/powerpoint/2013/contentapp">
+        <mc:Choice Requires="we pca">
           <p:graphicFrame>
             <p:nvGraphicFramePr>
               <p:cNvPr id="5" name="Content Placeholder 4" title="Code Presenter Pro"/>
@@ -7197,7 +7197,7 @@
             </a:graphic>
           </p:graphicFrame>
         </mc:Choice>
-        <mc:Fallback>
+        <mc:Fallback xmlns="">
           <p:pic>
             <p:nvPicPr>
               <p:cNvPr id="5" name="Content Placeholder 4" title="Code Presenter Pro"/>
@@ -8429,16 +8429,12 @@
           <a:lstStyle/>
           <a:p>
             <a:r>
+              <a:rPr lang="en-US"/>
+              <a:t>Adding Node.js </a:t>
+            </a:r>
+            <a:r>
               <a:rPr lang="en-US" dirty="0"/>
-              <a:t>Enabling </a:t>
-            </a:r>
-            <a:r>
-              <a:rPr lang="en-US" dirty="0" err="1"/>
-              <a:t>CommonJS</a:t>
-            </a:r>
-            <a:r>
-              <a:rPr lang="en-US" dirty="0"/>
-              <a:t> &amp; </a:t>
+              <a:t>&amp; </a:t>
             </a:r>
             <a:r>
               <a:rPr lang="en-US" dirty="0" err="1"/>
@@ -8446,7 +8442,7 @@
             </a:r>
             <a:r>
               <a:rPr lang="en-US" dirty="0"/>
-              <a:t> Support</a:t>
+              <a:t> Type Definitions</a:t>
             </a:r>
           </a:p>
         </p:txBody>
@@ -8657,7 +8653,7 @@
           <a:p>
             <a:r>
               <a:rPr lang="en-US" dirty="0"/>
-              <a:t>Current = v1.2.0</a:t>
+              <a:t>Current = v1.2.1</a:t>
             </a:r>
           </a:p>
           <a:p>
@@ -8880,7 +8876,7 @@
         </p:blipFill>
         <p:spPr>
           <a:xfrm>
-            <a:off x="4385164" y="160527"/>
+            <a:off x="4385164" y="165970"/>
             <a:ext cx="11448414" cy="7531098"/>
           </a:xfrm>
           <a:prstGeom prst="rect">

</xml_diff>

<commit_message>
Minor verbiage tweak on Typings slide
</commit_message>
<xml_diff>
--- a/Intro to JavaScript Tooling in VS Code - devObjective.pptx
+++ b/Intro to JavaScript Tooling in VS Code - devObjective.pptx
@@ -251,7 +251,7 @@
           <a:p>
             <a:fld id="{669E24BE-8A14-406C-93AE-FEDF4702362B}" type="datetimeFigureOut">
               <a:rPr lang="en-US" smtClean="0"/>
-              <a:t>6/15/2016</a:t>
+              <a:t>6/16/2016</a:t>
             </a:fld>
             <a:endParaRPr lang="en-US" dirty="0"/>
           </a:p>
@@ -1509,7 +1509,7 @@
           <a:p>
             <a:fld id="{8008D7A7-D1E9-49FE-B288-75D755D02F1B}" type="datetime1">
               <a:rPr lang="en-US" smtClean="0"/>
-              <a:t>6/15/2016</a:t>
+              <a:t>6/16/2016</a:t>
             </a:fld>
             <a:endParaRPr lang="en-US" dirty="0"/>
           </a:p>
@@ -1772,7 +1772,7 @@
           <a:p>
             <a:fld id="{565130A9-CCEE-4E49-AF50-9A9178C093F5}" type="datetime1">
               <a:rPr lang="en-US" smtClean="0"/>
-              <a:t>6/15/2016</a:t>
+              <a:t>6/16/2016</a:t>
             </a:fld>
             <a:endParaRPr lang="en-US" dirty="0"/>
           </a:p>
@@ -2098,7 +2098,7 @@
           <a:p>
             <a:fld id="{5FFEE7F5-B2E5-489A-976D-734D7F853DE3}" type="datetime1">
               <a:rPr lang="en-US" smtClean="0"/>
-              <a:t>6/15/2016</a:t>
+              <a:t>6/16/2016</a:t>
             </a:fld>
             <a:endParaRPr lang="en-US" dirty="0"/>
           </a:p>
@@ -2451,7 +2451,7 @@
           <a:p>
             <a:fld id="{1DDC5727-5F18-4B62-81B5-C092F8CCA971}" type="datetime1">
               <a:rPr lang="en-US" smtClean="0"/>
-              <a:t>6/15/2016</a:t>
+              <a:t>6/16/2016</a:t>
             </a:fld>
             <a:endParaRPr lang="en-US" dirty="0"/>
           </a:p>
@@ -2777,7 +2777,7 @@
           <a:p>
             <a:fld id="{DD7596D5-BBCA-4EE5-AC34-2F838BA68892}" type="datetime1">
               <a:rPr lang="en-US" smtClean="0"/>
-              <a:t>6/15/2016</a:t>
+              <a:t>6/16/2016</a:t>
             </a:fld>
             <a:endParaRPr lang="en-US" dirty="0"/>
           </a:p>
@@ -3182,7 +3182,7 @@
           <a:p>
             <a:fld id="{C87E594A-105F-4330-BE78-40BFD5E05FF3}" type="datetime1">
               <a:rPr lang="en-US" smtClean="0"/>
-              <a:t>6/15/2016</a:t>
+              <a:t>6/16/2016</a:t>
             </a:fld>
             <a:endParaRPr lang="en-US" dirty="0"/>
           </a:p>
@@ -3364,7 +3364,7 @@
           <a:p>
             <a:fld id="{50DAB467-0635-440B-9BC4-DA322DD73B70}" type="datetime1">
               <a:rPr lang="en-US" smtClean="0"/>
-              <a:t>6/15/2016</a:t>
+              <a:t>6/16/2016</a:t>
             </a:fld>
             <a:endParaRPr lang="en-US" dirty="0"/>
           </a:p>
@@ -3556,7 +3556,7 @@
           <a:p>
             <a:fld id="{5E48D92D-E3A5-4B10-B1FC-D041F161170C}" type="datetime1">
               <a:rPr lang="en-US" smtClean="0"/>
-              <a:t>6/15/2016</a:t>
+              <a:t>6/16/2016</a:t>
             </a:fld>
             <a:endParaRPr lang="en-US" dirty="0"/>
           </a:p>
@@ -3744,7 +3744,7 @@
           <a:p>
             <a:fld id="{834C18EA-D952-4AE1-A6E7-E6731635F9D2}" type="datetime1">
               <a:rPr lang="en-US" smtClean="0"/>
-              <a:t>6/15/2016</a:t>
+              <a:t>6/16/2016</a:t>
             </a:fld>
             <a:endParaRPr lang="en-US" dirty="0"/>
           </a:p>
@@ -4003,7 +4003,7 @@
           <a:p>
             <a:fld id="{13032A52-9E14-487A-A3FB-E00D36231CE7}" type="datetime1">
               <a:rPr lang="en-US" smtClean="0"/>
-              <a:t>6/15/2016</a:t>
+              <a:t>6/16/2016</a:t>
             </a:fld>
             <a:endParaRPr lang="en-US" dirty="0"/>
           </a:p>
@@ -4247,7 +4247,7 @@
           <a:p>
             <a:fld id="{8C5CA72F-91C6-447B-8CFD-10CC50FBFEAC}" type="datetime1">
               <a:rPr lang="en-US" smtClean="0"/>
-              <a:t>6/15/2016</a:t>
+              <a:t>6/16/2016</a:t>
             </a:fld>
             <a:endParaRPr lang="en-US" dirty="0"/>
           </a:p>
@@ -4633,7 +4633,7 @@
           <a:p>
             <a:fld id="{2CCBA931-94B6-4C88-A7AC-0B43FAFFEEC1}" type="datetime1">
               <a:rPr lang="en-US" smtClean="0"/>
-              <a:t>6/15/2016</a:t>
+              <a:t>6/16/2016</a:t>
             </a:fld>
             <a:endParaRPr lang="en-US" dirty="0"/>
           </a:p>
@@ -4768,7 +4768,7 @@
           <a:p>
             <a:fld id="{A17CC6B2-4719-4EFD-BB2D-A2C62F0625B7}" type="datetime1">
               <a:rPr lang="en-US" smtClean="0"/>
-              <a:t>6/15/2016</a:t>
+              <a:t>6/16/2016</a:t>
             </a:fld>
             <a:endParaRPr lang="en-US" dirty="0"/>
           </a:p>
@@ -4875,7 +4875,7 @@
           <a:p>
             <a:fld id="{9AC4E54B-2176-4BC1-BC54-F80551EDB034}" type="datetime1">
               <a:rPr lang="en-US" smtClean="0"/>
-              <a:t>6/15/2016</a:t>
+              <a:t>6/16/2016</a:t>
             </a:fld>
             <a:endParaRPr lang="en-US" dirty="0"/>
           </a:p>
@@ -5142,7 +5142,7 @@
           <a:p>
             <a:fld id="{F73BBE7C-717C-4AB2-A881-24835FA94B24}" type="datetime1">
               <a:rPr lang="en-US" smtClean="0"/>
-              <a:t>6/15/2016</a:t>
+              <a:t>6/16/2016</a:t>
             </a:fld>
             <a:endParaRPr lang="en-US" dirty="0"/>
           </a:p>
@@ -5416,7 +5416,7 @@
           <a:p>
             <a:fld id="{BD6C4C3D-17A3-49F5-8381-0500C8735BF2}" type="datetime1">
               <a:rPr lang="en-US" smtClean="0"/>
-              <a:t>6/15/2016</a:t>
+              <a:t>6/16/2016</a:t>
             </a:fld>
             <a:endParaRPr lang="en-US" dirty="0"/>
           </a:p>
@@ -6171,7 +6171,7 @@
           <a:p>
             <a:fld id="{1D480221-EA8F-4F92-87B7-59E96BBC3974}" type="datetime1">
               <a:rPr lang="en-US" smtClean="0"/>
-              <a:t>6/15/2016</a:t>
+              <a:t>6/16/2016</a:t>
             </a:fld>
             <a:endParaRPr lang="en-US" dirty="0"/>
           </a:p>
@@ -7764,11 +7764,11 @@
           <a:p>
             <a:pPr lvl="1"/>
             <a:r>
-              <a:rPr lang="en-US" b="1" dirty="0"/>
-              <a:t>Now:</a:t>
-            </a:r>
-            <a:r>
-              <a:rPr lang="en-US" dirty="0"/>
+              <a:rPr lang="en-US" b="1"/>
+              <a:t>Shiny:</a:t>
+            </a:r>
+            <a:r>
+              <a:rPr lang="en-US"/>
               <a:t> </a:t>
             </a:r>
             <a:r>
@@ -7832,21 +7832,7 @@
                 <a:latin typeface="Consolas" panose="020B0609020204030204" pitchFamily="49" charset="0"/>
                 <a:cs typeface="Consolas" panose="020B0609020204030204" pitchFamily="49" charset="0"/>
               </a:rPr>
-              <a:t>Angular</a:t>
-            </a:r>
-            <a:r>
-              <a:rPr lang="en-US">
-                <a:latin typeface="Consolas" panose="020B0609020204030204" pitchFamily="49" charset="0"/>
-                <a:cs typeface="Consolas" panose="020B0609020204030204" pitchFamily="49" charset="0"/>
-              </a:rPr>
-              <a:t>, Gulp, </a:t>
-            </a:r>
-            <a:r>
-              <a:rPr lang="en-US" dirty="0">
-                <a:latin typeface="Consolas" panose="020B0609020204030204" pitchFamily="49" charset="0"/>
-                <a:cs typeface="Consolas" panose="020B0609020204030204" pitchFamily="49" charset="0"/>
-              </a:rPr>
-              <a:t>React, etc.</a:t>
+              <a:t>Angular, Gulp, React, etc.</a:t>
             </a:r>
           </a:p>
         </p:txBody>
@@ -10005,8 +9991,8 @@
           </a:p>
         </p:txBody>
       </p:sp>
-      <mc:AlternateContent xmlns:mc="http://schemas.openxmlformats.org/markup-compatibility/2006" xmlns:we="http://schemas.microsoft.com/office/webextensions/webextension/2010/11" xmlns:pca="http://schemas.microsoft.com/office/powerpoint/2013/contentapp">
-        <mc:Choice Requires="we pca">
+      <mc:AlternateContent xmlns:mc="http://schemas.openxmlformats.org/markup-compatibility/2006">
+        <mc:Choice xmlns:we="http://schemas.microsoft.com/office/webextensions/webextension/2010/11" xmlns:pca="http://schemas.microsoft.com/office/powerpoint/2013/contentapp" Requires="we pca">
           <p:graphicFrame>
             <p:nvGraphicFramePr>
               <p:cNvPr id="5" name="Content Placeholder 4" title="Code Presenter Pro"/>
@@ -10033,7 +10019,7 @@
             </a:graphic>
           </p:graphicFrame>
         </mc:Choice>
-        <mc:Fallback xmlns="">
+        <mc:Fallback>
           <p:pic>
             <p:nvPicPr>
               <p:cNvPr id="5" name="Content Placeholder 4" title="Code Presenter Pro"/>
@@ -10441,8 +10427,8 @@
           </a:p>
         </p:txBody>
       </p:sp>
-      <mc:AlternateContent xmlns:mc="http://schemas.openxmlformats.org/markup-compatibility/2006" xmlns:we="http://schemas.microsoft.com/office/webextensions/webextension/2010/11" xmlns:pca="http://schemas.microsoft.com/office/powerpoint/2013/contentapp">
-        <mc:Choice Requires="we pca">
+      <mc:AlternateContent xmlns:mc="http://schemas.openxmlformats.org/markup-compatibility/2006">
+        <mc:Choice xmlns:we="http://schemas.microsoft.com/office/webextensions/webextension/2010/11" xmlns:pca="http://schemas.microsoft.com/office/powerpoint/2013/contentapp" Requires="we pca">
           <p:graphicFrame>
             <p:nvGraphicFramePr>
               <p:cNvPr id="2" name="Add-in 1" title="Code Presenter Pro"/>
@@ -10468,7 +10454,7 @@
             </a:graphic>
           </p:graphicFrame>
         </mc:Choice>
-        <mc:Fallback xmlns="">
+        <mc:Fallback>
           <p:pic>
             <p:nvPicPr>
               <p:cNvPr id="2" name="Add-in 1" title="Code Presenter Pro"/>
@@ -15180,8 +15166,8 @@
           </a:p>
         </p:txBody>
       </p:sp>
-      <mc:AlternateContent xmlns:mc="http://schemas.openxmlformats.org/markup-compatibility/2006">
-        <mc:Choice xmlns:we="http://schemas.microsoft.com/office/webextensions/webextension/2010/11" xmlns:pca="http://schemas.microsoft.com/office/powerpoint/2013/contentapp" Requires="we pca">
+      <mc:AlternateContent xmlns:mc="http://schemas.openxmlformats.org/markup-compatibility/2006" xmlns:we="http://schemas.microsoft.com/office/webextensions/webextension/2010/11" xmlns:pca="http://schemas.microsoft.com/office/powerpoint/2013/contentapp">
+        <mc:Choice Requires="we pca">
           <p:graphicFrame>
             <p:nvGraphicFramePr>
               <p:cNvPr id="5" name="Content Placeholder 4" title="Code Presenter Pro"/>
@@ -15208,7 +15194,7 @@
             </a:graphic>
           </p:graphicFrame>
         </mc:Choice>
-        <mc:Fallback>
+        <mc:Fallback xmlns="">
           <p:pic>
             <p:nvPicPr>
               <p:cNvPr id="5" name="Content Placeholder 4" title="Code Presenter Pro"/>

</xml_diff>